<commit_message>
acpt: add scenarios for ValueAxis.major/minor_unit
</commit_message>
<xml_diff>
--- a/features/steps/test_files/cht-axis-props.pptx
+++ b/features/steps/test_files/cht-axis-props.pptx
@@ -6,6 +6,7 @@
   </p:sldMasterIdLst>
   <p:sldIdLst>
     <p:sldId id="256" r:id="rId2"/>
+    <p:sldId id="257" r:id="rId3"/>
   </p:sldIdLst>
   <p:sldSz cx="9144000" cy="6858000" type="screen4x3"/>
   <p:notesSz cx="6858000" cy="9144000"/>
@@ -308,11 +309,11 @@
           <c:showBubbleSize val="0"/>
         </c:dLbls>
         <c:gapWidth val="150"/>
-        <c:axId val="-2070575352"/>
-        <c:axId val="-2070572264"/>
+        <c:axId val="-2031668952"/>
+        <c:axId val="-2031280632"/>
       </c:barChart>
       <c:catAx>
-        <c:axId val="-2070575352"/>
+        <c:axId val="-2031668952"/>
         <c:scaling>
           <c:orientation val="minMax"/>
         </c:scaling>
@@ -321,7 +322,7 @@
         <c:majorTickMark val="out"/>
         <c:minorTickMark val="none"/>
         <c:tickLblPos val="nextTo"/>
-        <c:crossAx val="-2070572264"/>
+        <c:crossAx val="-2031280632"/>
         <c:crosses val="autoZero"/>
         <c:auto val="1"/>
         <c:lblAlgn val="ctr"/>
@@ -329,7 +330,7 @@
         <c:noMultiLvlLbl val="0"/>
       </c:catAx>
       <c:valAx>
-        <c:axId val="-2070572264"/>
+        <c:axId val="-2031280632"/>
         <c:scaling>
           <c:orientation val="minMax"/>
         </c:scaling>
@@ -341,9 +342,274 @@
         <c:majorTickMark val="out"/>
         <c:minorTickMark val="none"/>
         <c:tickLblPos val="nextTo"/>
-        <c:crossAx val="-2070575352"/>
+        <c:crossAx val="-2031668952"/>
         <c:crosses val="autoZero"/>
         <c:crossBetween val="between"/>
+      </c:valAx>
+    </c:plotArea>
+    <c:legend>
+      <c:legendPos val="r"/>
+      <c:layout/>
+      <c:overlay val="0"/>
+    </c:legend>
+    <c:plotVisOnly val="1"/>
+    <c:dispBlanksAs val="gap"/>
+    <c:showDLblsOverMax val="0"/>
+  </c:chart>
+  <c:txPr>
+    <a:bodyPr/>
+    <a:lstStyle/>
+    <a:p>
+      <a:pPr>
+        <a:defRPr sz="1800"/>
+      </a:pPr>
+      <a:endParaRPr lang="en-US"/>
+    </a:p>
+  </c:txPr>
+  <c:externalData r:id="rId1">
+    <c:autoUpdate val="0"/>
+  </c:externalData>
+</c:chartSpace>
+</file>
+
+<file path=ppt/charts/chart2.xml><?xml version="1.0" encoding="utf-8"?>
+<c:chartSpace xmlns:c="http://schemas.openxmlformats.org/drawingml/2006/chart" xmlns:a="http://schemas.openxmlformats.org/drawingml/2006/main" xmlns:r="http://schemas.openxmlformats.org/officeDocument/2006/relationships">
+  <c:date1904 val="0"/>
+  <c:lang val="en-US"/>
+  <c:roundedCorners val="0"/>
+  <mc:AlternateContent xmlns:mc="http://schemas.openxmlformats.org/markup-compatibility/2006">
+    <mc:Choice xmlns:c14="http://schemas.microsoft.com/office/drawing/2007/8/2/chart" Requires="c14">
+      <c14:style val="118"/>
+    </mc:Choice>
+    <mc:Fallback>
+      <c:style val="18"/>
+    </mc:Fallback>
+  </mc:AlternateContent>
+  <c:chart>
+    <c:autoTitleDeleted val="0"/>
+    <c:plotArea>
+      <c:layout/>
+      <c:barChart>
+        <c:barDir val="col"/>
+        <c:grouping val="clustered"/>
+        <c:varyColors val="0"/>
+        <c:ser>
+          <c:idx val="0"/>
+          <c:order val="0"/>
+          <c:tx>
+            <c:strRef>
+              <c:f>Sheet1!$B$1</c:f>
+              <c:strCache>
+                <c:ptCount val="1"/>
+                <c:pt idx="0">
+                  <c:v>Series 1</c:v>
+                </c:pt>
+              </c:strCache>
+            </c:strRef>
+          </c:tx>
+          <c:invertIfNegative val="0"/>
+          <c:cat>
+            <c:strRef>
+              <c:f>Sheet1!$A$2:$A$5</c:f>
+              <c:strCache>
+                <c:ptCount val="4"/>
+                <c:pt idx="0">
+                  <c:v>Category 1</c:v>
+                </c:pt>
+                <c:pt idx="1">
+                  <c:v>Category 2</c:v>
+                </c:pt>
+                <c:pt idx="2">
+                  <c:v>Category 3</c:v>
+                </c:pt>
+                <c:pt idx="3">
+                  <c:v>Category 4</c:v>
+                </c:pt>
+              </c:strCache>
+            </c:strRef>
+          </c:cat>
+          <c:val>
+            <c:numRef>
+              <c:f>Sheet1!$B$2:$B$5</c:f>
+              <c:numCache>
+                <c:formatCode>General</c:formatCode>
+                <c:ptCount val="4"/>
+                <c:pt idx="0">
+                  <c:v>94.3</c:v>
+                </c:pt>
+                <c:pt idx="1">
+                  <c:v>2.5</c:v>
+                </c:pt>
+                <c:pt idx="2">
+                  <c:v>3.5</c:v>
+                </c:pt>
+                <c:pt idx="3">
+                  <c:v>4.5</c:v>
+                </c:pt>
+              </c:numCache>
+            </c:numRef>
+          </c:val>
+        </c:ser>
+        <c:ser>
+          <c:idx val="1"/>
+          <c:order val="1"/>
+          <c:tx>
+            <c:strRef>
+              <c:f>Sheet1!$C$1</c:f>
+              <c:strCache>
+                <c:ptCount val="1"/>
+                <c:pt idx="0">
+                  <c:v>Series 2</c:v>
+                </c:pt>
+              </c:strCache>
+            </c:strRef>
+          </c:tx>
+          <c:invertIfNegative val="0"/>
+          <c:cat>
+            <c:strRef>
+              <c:f>Sheet1!$A$2:$A$5</c:f>
+              <c:strCache>
+                <c:ptCount val="4"/>
+                <c:pt idx="0">
+                  <c:v>Category 1</c:v>
+                </c:pt>
+                <c:pt idx="1">
+                  <c:v>Category 2</c:v>
+                </c:pt>
+                <c:pt idx="2">
+                  <c:v>Category 3</c:v>
+                </c:pt>
+                <c:pt idx="3">
+                  <c:v>Category 4</c:v>
+                </c:pt>
+              </c:strCache>
+            </c:strRef>
+          </c:cat>
+          <c:val>
+            <c:numRef>
+              <c:f>Sheet1!$C$2:$C$5</c:f>
+              <c:numCache>
+                <c:formatCode>General</c:formatCode>
+                <c:ptCount val="4"/>
+                <c:pt idx="0">
+                  <c:v>2.4</c:v>
+                </c:pt>
+                <c:pt idx="1">
+                  <c:v>4.4</c:v>
+                </c:pt>
+                <c:pt idx="2">
+                  <c:v>1.8</c:v>
+                </c:pt>
+                <c:pt idx="3">
+                  <c:v>2.8</c:v>
+                </c:pt>
+              </c:numCache>
+            </c:numRef>
+          </c:val>
+        </c:ser>
+        <c:ser>
+          <c:idx val="2"/>
+          <c:order val="2"/>
+          <c:tx>
+            <c:strRef>
+              <c:f>Sheet1!$D$1</c:f>
+              <c:strCache>
+                <c:ptCount val="1"/>
+                <c:pt idx="0">
+                  <c:v>Series 3</c:v>
+                </c:pt>
+              </c:strCache>
+            </c:strRef>
+          </c:tx>
+          <c:invertIfNegative val="0"/>
+          <c:cat>
+            <c:strRef>
+              <c:f>Sheet1!$A$2:$A$5</c:f>
+              <c:strCache>
+                <c:ptCount val="4"/>
+                <c:pt idx="0">
+                  <c:v>Category 1</c:v>
+                </c:pt>
+                <c:pt idx="1">
+                  <c:v>Category 2</c:v>
+                </c:pt>
+                <c:pt idx="2">
+                  <c:v>Category 3</c:v>
+                </c:pt>
+                <c:pt idx="3">
+                  <c:v>Category 4</c:v>
+                </c:pt>
+              </c:strCache>
+            </c:strRef>
+          </c:cat>
+          <c:val>
+            <c:numRef>
+              <c:f>Sheet1!$D$2:$D$5</c:f>
+              <c:numCache>
+                <c:formatCode>General</c:formatCode>
+                <c:ptCount val="4"/>
+                <c:pt idx="0">
+                  <c:v>2.0</c:v>
+                </c:pt>
+                <c:pt idx="1">
+                  <c:v>2.0</c:v>
+                </c:pt>
+                <c:pt idx="2">
+                  <c:v>3.0</c:v>
+                </c:pt>
+                <c:pt idx="3">
+                  <c:v>5.0</c:v>
+                </c:pt>
+              </c:numCache>
+            </c:numRef>
+          </c:val>
+        </c:ser>
+        <c:dLbls>
+          <c:showLegendKey val="0"/>
+          <c:showVal val="0"/>
+          <c:showCatName val="0"/>
+          <c:showSerName val="0"/>
+          <c:showPercent val="0"/>
+          <c:showBubbleSize val="0"/>
+        </c:dLbls>
+        <c:gapWidth val="150"/>
+        <c:axId val="-2030881944"/>
+        <c:axId val="-2030611096"/>
+      </c:barChart>
+      <c:catAx>
+        <c:axId val="-2030881944"/>
+        <c:scaling>
+          <c:orientation val="minMax"/>
+        </c:scaling>
+        <c:delete val="0"/>
+        <c:axPos val="b"/>
+        <c:majorTickMark val="out"/>
+        <c:minorTickMark val="none"/>
+        <c:tickLblPos val="nextTo"/>
+        <c:crossAx val="-2030611096"/>
+        <c:crosses val="autoZero"/>
+        <c:auto val="1"/>
+        <c:lblAlgn val="ctr"/>
+        <c:lblOffset val="100"/>
+        <c:noMultiLvlLbl val="0"/>
+      </c:catAx>
+      <c:valAx>
+        <c:axId val="-2030611096"/>
+        <c:scaling>
+          <c:orientation val="minMax"/>
+        </c:scaling>
+        <c:delete val="0"/>
+        <c:axPos val="l"/>
+        <c:majorGridlines/>
+        <c:numFmt formatCode="General" sourceLinked="1"/>
+        <c:majorTickMark val="out"/>
+        <c:minorTickMark val="out"/>
+        <c:tickLblPos val="nextTo"/>
+        <c:crossAx val="-2030881944"/>
+        <c:crosses val="autoZero"/>
+        <c:crossBetween val="between"/>
+        <c:majorUnit val="20.0"/>
+        <c:minorUnit val="4.2"/>
       </c:valAx>
     </c:plotArea>
     <c:legend>
@@ -720,6 +986,58 @@
     <p:extLst>
       <p:ext uri="{BB962C8B-B14F-4D97-AF65-F5344CB8AC3E}">
         <p14:creationId xmlns:p14="http://schemas.microsoft.com/office/powerpoint/2010/main" val="924445888"/>
+      </p:ext>
+    </p:extLst>
+  </p:cSld>
+  <p:clrMapOvr>
+    <a:masterClrMapping/>
+  </p:clrMapOvr>
+</p:sld>
+</file>
+
+<file path=ppt/slides/slide2.xml><?xml version="1.0" encoding="utf-8"?>
+<p:sld xmlns:a="http://schemas.openxmlformats.org/drawingml/2006/main" xmlns:r="http://schemas.openxmlformats.org/officeDocument/2006/relationships" xmlns:p="http://schemas.openxmlformats.org/presentationml/2006/main">
+  <p:cSld>
+    <p:spTree>
+      <p:nvGrpSpPr>
+        <p:cNvPr id="1" name=""/>
+        <p:cNvGrpSpPr/>
+        <p:nvPr/>
+      </p:nvGrpSpPr>
+      <p:grpSpPr>
+        <a:xfrm>
+          <a:off x="0" y="0"/>
+          <a:ext cx="0" cy="0"/>
+          <a:chOff x="0" y="0"/>
+          <a:chExt cx="0" cy="0"/>
+        </a:xfrm>
+      </p:grpSpPr>
+      <p:graphicFrame>
+        <p:nvGraphicFramePr>
+          <p:cNvPr id="2" name="Chart 1"/>
+          <p:cNvGraphicFramePr/>
+          <p:nvPr>
+            <p:extLst>
+              <p:ext uri="{D42A27DB-BD31-4B8C-83A1-F6EECF244321}">
+                <p14:modId xmlns:p14="http://schemas.microsoft.com/office/powerpoint/2010/main" val="389297289"/>
+              </p:ext>
+            </p:extLst>
+          </p:nvPr>
+        </p:nvGraphicFramePr>
+        <p:xfrm>
+          <a:off x="1524000" y="1397000"/>
+          <a:ext cx="6096000" cy="4064000"/>
+        </p:xfrm>
+        <a:graphic>
+          <a:graphicData uri="http://schemas.openxmlformats.org/drawingml/2006/chart">
+            <c:chart xmlns:c="http://schemas.openxmlformats.org/drawingml/2006/chart" xmlns:r="http://schemas.openxmlformats.org/officeDocument/2006/relationships" r:id="rId2"/>
+          </a:graphicData>
+        </a:graphic>
+      </p:graphicFrame>
+    </p:spTree>
+    <p:extLst>
+      <p:ext uri="{BB962C8B-B14F-4D97-AF65-F5344CB8AC3E}">
+        <p14:creationId xmlns:p14="http://schemas.microsoft.com/office/powerpoint/2010/main" val="394367202"/>
       </p:ext>
     </p:extLst>
   </p:cSld>

</xml_diff>

<commit_message>
acpt: add scenarios for ValueAxis.crosses
</commit_message>
<xml_diff>
--- a/features/steps/test_files/cht-axis-props.pptx
+++ b/features/steps/test_files/cht-axis-props.pptx
@@ -7,6 +7,10 @@
   <p:sldIdLst>
     <p:sldId id="256" r:id="rId2"/>
     <p:sldId id="257" r:id="rId3"/>
+    <p:sldId id="260" r:id="rId4"/>
+    <p:sldId id="261" r:id="rId5"/>
+    <p:sldId id="258" r:id="rId6"/>
+    <p:sldId id="259" r:id="rId7"/>
   </p:sldIdLst>
   <p:sldSz cx="9144000" cy="6858000" type="screen4x3"/>
   <p:notesSz cx="6858000" cy="9144000"/>
@@ -309,11 +313,11 @@
           <c:showBubbleSize val="0"/>
         </c:dLbls>
         <c:gapWidth val="150"/>
-        <c:axId val="-2031668952"/>
-        <c:axId val="-2031280632"/>
+        <c:axId val="-2096221016"/>
+        <c:axId val="2053160680"/>
       </c:barChart>
       <c:catAx>
-        <c:axId val="-2031668952"/>
+        <c:axId val="-2096221016"/>
         <c:scaling>
           <c:orientation val="minMax"/>
         </c:scaling>
@@ -322,7 +326,7 @@
         <c:majorTickMark val="out"/>
         <c:minorTickMark val="none"/>
         <c:tickLblPos val="nextTo"/>
-        <c:crossAx val="-2031280632"/>
+        <c:crossAx val="2053160680"/>
         <c:crosses val="autoZero"/>
         <c:auto val="1"/>
         <c:lblAlgn val="ctr"/>
@@ -330,7 +334,7 @@
         <c:noMultiLvlLbl val="0"/>
       </c:catAx>
       <c:valAx>
-        <c:axId val="-2031280632"/>
+        <c:axId val="2053160680"/>
         <c:scaling>
           <c:orientation val="minMax"/>
         </c:scaling>
@@ -342,7 +346,7 @@
         <c:majorTickMark val="out"/>
         <c:minorTickMark val="none"/>
         <c:tickLblPos val="nextTo"/>
-        <c:crossAx val="-2031668952"/>
+        <c:crossAx val="-2096221016"/>
         <c:crosses val="autoZero"/>
         <c:crossBetween val="between"/>
       </c:valAx>
@@ -573,11 +577,11 @@
           <c:showBubbleSize val="0"/>
         </c:dLbls>
         <c:gapWidth val="150"/>
-        <c:axId val="-2030881944"/>
-        <c:axId val="-2030611096"/>
+        <c:axId val="-2106446296"/>
+        <c:axId val="-2109040920"/>
       </c:barChart>
       <c:catAx>
-        <c:axId val="-2030881944"/>
+        <c:axId val="-2106446296"/>
         <c:scaling>
           <c:orientation val="minMax"/>
         </c:scaling>
@@ -586,7 +590,7 @@
         <c:majorTickMark val="out"/>
         <c:minorTickMark val="none"/>
         <c:tickLblPos val="nextTo"/>
-        <c:crossAx val="-2030611096"/>
+        <c:crossAx val="-2109040920"/>
         <c:crosses val="autoZero"/>
         <c:auto val="1"/>
         <c:lblAlgn val="ctr"/>
@@ -594,7 +598,7 @@
         <c:noMultiLvlLbl val="0"/>
       </c:catAx>
       <c:valAx>
-        <c:axId val="-2030611096"/>
+        <c:axId val="-2109040920"/>
         <c:scaling>
           <c:orientation val="minMax"/>
         </c:scaling>
@@ -605,11 +609,664 @@
         <c:majorTickMark val="out"/>
         <c:minorTickMark val="out"/>
         <c:tickLblPos val="nextTo"/>
-        <c:crossAx val="-2030881944"/>
+        <c:crossAx val="-2106446296"/>
         <c:crosses val="autoZero"/>
         <c:crossBetween val="between"/>
         <c:majorUnit val="20.0"/>
         <c:minorUnit val="4.2"/>
+      </c:valAx>
+    </c:plotArea>
+    <c:legend>
+      <c:legendPos val="r"/>
+      <c:layout/>
+      <c:overlay val="0"/>
+    </c:legend>
+    <c:plotVisOnly val="1"/>
+    <c:dispBlanksAs val="gap"/>
+    <c:showDLblsOverMax val="0"/>
+  </c:chart>
+  <c:txPr>
+    <a:bodyPr/>
+    <a:lstStyle/>
+    <a:p>
+      <a:pPr>
+        <a:defRPr sz="1800"/>
+      </a:pPr>
+      <a:endParaRPr lang="en-US"/>
+    </a:p>
+  </c:txPr>
+  <c:externalData r:id="rId1">
+    <c:autoUpdate val="0"/>
+  </c:externalData>
+</c:chartSpace>
+</file>
+
+<file path=ppt/charts/chart3.xml><?xml version="1.0" encoding="utf-8"?>
+<c:chartSpace xmlns:c="http://schemas.openxmlformats.org/drawingml/2006/chart" xmlns:a="http://schemas.openxmlformats.org/drawingml/2006/main" xmlns:r="http://schemas.openxmlformats.org/officeDocument/2006/relationships">
+  <c:date1904 val="0"/>
+  <c:lang val="en-US"/>
+  <c:roundedCorners val="0"/>
+  <mc:AlternateContent xmlns:mc="http://schemas.openxmlformats.org/markup-compatibility/2006">
+    <mc:Choice xmlns:c14="http://schemas.microsoft.com/office/drawing/2007/8/2/chart" Requires="c14">
+      <c14:style val="118"/>
+    </mc:Choice>
+    <mc:Fallback>
+      <c:style val="18"/>
+    </mc:Fallback>
+  </mc:AlternateContent>
+  <c:chart>
+    <c:title>
+      <c:tx>
+        <c:rich>
+          <a:bodyPr/>
+          <a:lstStyle/>
+          <a:p>
+            <a:pPr>
+              <a:defRPr sz="2000"/>
+            </a:pPr>
+            <a:r>
+              <a:rPr lang="en-US" sz="1600" b="0" i="1" baseline="0" dirty="0" err="1" smtClean="0">
+                <a:effectLst/>
+              </a:rPr>
+              <a:t>value_axis.crosses</a:t>
+            </a:r>
+            <a:r>
+              <a:rPr lang="en-US" sz="1600" b="0" i="1" baseline="0" dirty="0" smtClean="0">
+                <a:effectLst/>
+              </a:rPr>
+              <a:t> == XL_AXIS_CROSSES.MAXIMUM</a:t>
+            </a:r>
+            <a:endParaRPr lang="en-US" sz="2000" dirty="0">
+              <a:effectLst/>
+            </a:endParaRPr>
+          </a:p>
+        </c:rich>
+      </c:tx>
+      <c:layout/>
+      <c:overlay val="0"/>
+    </c:title>
+    <c:autoTitleDeleted val="0"/>
+    <c:plotArea>
+      <c:layout/>
+      <c:scatterChart>
+        <c:scatterStyle val="lineMarker"/>
+        <c:varyColors val="0"/>
+        <c:ser>
+          <c:idx val="0"/>
+          <c:order val="0"/>
+          <c:tx>
+            <c:strRef>
+              <c:f>Sheet1!$B$1</c:f>
+              <c:strCache>
+                <c:ptCount val="1"/>
+                <c:pt idx="0">
+                  <c:v>Y-Value 1</c:v>
+                </c:pt>
+              </c:strCache>
+            </c:strRef>
+          </c:tx>
+          <c:spPr>
+            <a:ln w="47625">
+              <a:noFill/>
+            </a:ln>
+          </c:spPr>
+          <c:xVal>
+            <c:numRef>
+              <c:f>Sheet1!$A$2:$A$4</c:f>
+              <c:numCache>
+                <c:formatCode>General</c:formatCode>
+                <c:ptCount val="3"/>
+                <c:pt idx="0">
+                  <c:v>0.7</c:v>
+                </c:pt>
+                <c:pt idx="1">
+                  <c:v>1.8</c:v>
+                </c:pt>
+                <c:pt idx="2">
+                  <c:v>2.6</c:v>
+                </c:pt>
+              </c:numCache>
+            </c:numRef>
+          </c:xVal>
+          <c:yVal>
+            <c:numRef>
+              <c:f>Sheet1!$B$2:$B$4</c:f>
+              <c:numCache>
+                <c:formatCode>General</c:formatCode>
+                <c:ptCount val="3"/>
+                <c:pt idx="0">
+                  <c:v>2.7</c:v>
+                </c:pt>
+                <c:pt idx="1">
+                  <c:v>3.2</c:v>
+                </c:pt>
+                <c:pt idx="2">
+                  <c:v>0.8</c:v>
+                </c:pt>
+              </c:numCache>
+            </c:numRef>
+          </c:yVal>
+          <c:smooth val="0"/>
+        </c:ser>
+        <c:dLbls>
+          <c:showLegendKey val="0"/>
+          <c:showVal val="0"/>
+          <c:showCatName val="0"/>
+          <c:showSerName val="0"/>
+          <c:showPercent val="0"/>
+          <c:showBubbleSize val="0"/>
+        </c:dLbls>
+        <c:axId val="-2054914440"/>
+        <c:axId val="-2054303352"/>
+      </c:scatterChart>
+      <c:valAx>
+        <c:axId val="-2054914440"/>
+        <c:scaling>
+          <c:orientation val="minMax"/>
+        </c:scaling>
+        <c:delete val="0"/>
+        <c:axPos val="t"/>
+        <c:numFmt formatCode="General" sourceLinked="1"/>
+        <c:majorTickMark val="out"/>
+        <c:minorTickMark val="none"/>
+        <c:tickLblPos val="nextTo"/>
+        <c:crossAx val="-2054303352"/>
+        <c:crosses val="max"/>
+        <c:crossBetween val="midCat"/>
+      </c:valAx>
+      <c:valAx>
+        <c:axId val="-2054303352"/>
+        <c:scaling>
+          <c:orientation val="minMax"/>
+        </c:scaling>
+        <c:delete val="0"/>
+        <c:axPos val="l"/>
+        <c:majorGridlines/>
+        <c:numFmt formatCode="General" sourceLinked="1"/>
+        <c:majorTickMark val="out"/>
+        <c:minorTickMark val="none"/>
+        <c:tickLblPos val="nextTo"/>
+        <c:crossAx val="-2054914440"/>
+        <c:crosses val="autoZero"/>
+        <c:crossBetween val="midCat"/>
+      </c:valAx>
+    </c:plotArea>
+    <c:plotVisOnly val="1"/>
+    <c:dispBlanksAs val="gap"/>
+    <c:showDLblsOverMax val="0"/>
+  </c:chart>
+  <c:txPr>
+    <a:bodyPr/>
+    <a:lstStyle/>
+    <a:p>
+      <a:pPr>
+        <a:defRPr sz="1800"/>
+      </a:pPr>
+      <a:endParaRPr lang="en-US"/>
+    </a:p>
+  </c:txPr>
+  <c:externalData r:id="rId1">
+    <c:autoUpdate val="0"/>
+  </c:externalData>
+</c:chartSpace>
+</file>
+
+<file path=ppt/charts/chart4.xml><?xml version="1.0" encoding="utf-8"?>
+<c:chartSpace xmlns:c="http://schemas.openxmlformats.org/drawingml/2006/chart" xmlns:a="http://schemas.openxmlformats.org/drawingml/2006/main" xmlns:r="http://schemas.openxmlformats.org/officeDocument/2006/relationships">
+  <c:date1904 val="0"/>
+  <c:lang val="en-US"/>
+  <c:roundedCorners val="0"/>
+  <mc:AlternateContent xmlns:mc="http://schemas.openxmlformats.org/markup-compatibility/2006">
+    <mc:Choice xmlns:c14="http://schemas.microsoft.com/office/drawing/2007/8/2/chart" Requires="c14">
+      <c14:style val="118"/>
+    </mc:Choice>
+    <mc:Fallback>
+      <c:style val="18"/>
+    </mc:Fallback>
+  </mc:AlternateContent>
+  <c:chart>
+    <c:title>
+      <c:tx>
+        <c:rich>
+          <a:bodyPr/>
+          <a:lstStyle/>
+          <a:p>
+            <a:pPr>
+              <a:defRPr sz="1600" b="0" i="1"/>
+            </a:pPr>
+            <a:r>
+              <a:rPr lang="en-US" sz="1600" b="0" i="1" dirty="0" err="1" smtClean="0"/>
+              <a:t>value_axis.crosses</a:t>
+            </a:r>
+            <a:r>
+              <a:rPr lang="en-US" sz="1600" b="0" i="1" dirty="0" smtClean="0"/>
+              <a:t> == XL_AXIS_CROSSES.MINIMUM</a:t>
+            </a:r>
+            <a:endParaRPr lang="en-US" sz="1600" b="0" i="1" dirty="0"/>
+          </a:p>
+        </c:rich>
+      </c:tx>
+      <c:layout/>
+      <c:overlay val="0"/>
+    </c:title>
+    <c:autoTitleDeleted val="0"/>
+    <c:plotArea>
+      <c:layout/>
+      <c:bubbleChart>
+        <c:varyColors val="0"/>
+        <c:ser>
+          <c:idx val="0"/>
+          <c:order val="0"/>
+          <c:tx>
+            <c:strRef>
+              <c:f>Sheet1!$B$1</c:f>
+              <c:strCache>
+                <c:ptCount val="1"/>
+                <c:pt idx="0">
+                  <c:v>Y-Value 1</c:v>
+                </c:pt>
+              </c:strCache>
+            </c:strRef>
+          </c:tx>
+          <c:invertIfNegative val="0"/>
+          <c:xVal>
+            <c:numRef>
+              <c:f>Sheet1!$A$2:$A$4</c:f>
+              <c:numCache>
+                <c:formatCode>General</c:formatCode>
+                <c:ptCount val="3"/>
+                <c:pt idx="0">
+                  <c:v>0.7</c:v>
+                </c:pt>
+                <c:pt idx="1">
+                  <c:v>1.8</c:v>
+                </c:pt>
+                <c:pt idx="2">
+                  <c:v>2.6</c:v>
+                </c:pt>
+              </c:numCache>
+            </c:numRef>
+          </c:xVal>
+          <c:yVal>
+            <c:numRef>
+              <c:f>Sheet1!$B$2:$B$4</c:f>
+              <c:numCache>
+                <c:formatCode>General</c:formatCode>
+                <c:ptCount val="3"/>
+                <c:pt idx="0">
+                  <c:v>2.7</c:v>
+                </c:pt>
+                <c:pt idx="1">
+                  <c:v>3.2</c:v>
+                </c:pt>
+                <c:pt idx="2">
+                  <c:v>-3.8</c:v>
+                </c:pt>
+              </c:numCache>
+            </c:numRef>
+          </c:yVal>
+          <c:bubbleSize>
+            <c:numRef>
+              <c:f>Sheet1!$C$2:$C$4</c:f>
+              <c:numCache>
+                <c:formatCode>General</c:formatCode>
+                <c:ptCount val="3"/>
+                <c:pt idx="0">
+                  <c:v>10.0</c:v>
+                </c:pt>
+                <c:pt idx="1">
+                  <c:v>4.0</c:v>
+                </c:pt>
+                <c:pt idx="2">
+                  <c:v>8.0</c:v>
+                </c:pt>
+              </c:numCache>
+            </c:numRef>
+          </c:bubbleSize>
+          <c:bubble3D val="0"/>
+        </c:ser>
+        <c:dLbls>
+          <c:showLegendKey val="0"/>
+          <c:showVal val="0"/>
+          <c:showCatName val="0"/>
+          <c:showSerName val="0"/>
+          <c:showPercent val="0"/>
+          <c:showBubbleSize val="0"/>
+        </c:dLbls>
+        <c:bubbleScale val="100"/>
+        <c:showNegBubbles val="0"/>
+        <c:axId val="-2054634472"/>
+        <c:axId val="-2113201512"/>
+      </c:bubbleChart>
+      <c:valAx>
+        <c:axId val="-2054634472"/>
+        <c:scaling>
+          <c:orientation val="minMax"/>
+        </c:scaling>
+        <c:delete val="0"/>
+        <c:axPos val="b"/>
+        <c:numFmt formatCode="General" sourceLinked="1"/>
+        <c:majorTickMark val="out"/>
+        <c:minorTickMark val="none"/>
+        <c:tickLblPos val="nextTo"/>
+        <c:crossAx val="-2113201512"/>
+        <c:crosses val="min"/>
+        <c:crossBetween val="midCat"/>
+      </c:valAx>
+      <c:valAx>
+        <c:axId val="-2113201512"/>
+        <c:scaling>
+          <c:orientation val="minMax"/>
+        </c:scaling>
+        <c:delete val="0"/>
+        <c:axPos val="l"/>
+        <c:majorGridlines/>
+        <c:numFmt formatCode="General" sourceLinked="1"/>
+        <c:majorTickMark val="out"/>
+        <c:minorTickMark val="none"/>
+        <c:tickLblPos val="nextTo"/>
+        <c:crossAx val="-2054634472"/>
+        <c:crosses val="autoZero"/>
+        <c:crossBetween val="midCat"/>
+      </c:valAx>
+    </c:plotArea>
+    <c:plotVisOnly val="1"/>
+    <c:dispBlanksAs val="gap"/>
+    <c:showDLblsOverMax val="0"/>
+  </c:chart>
+  <c:txPr>
+    <a:bodyPr/>
+    <a:lstStyle/>
+    <a:p>
+      <a:pPr>
+        <a:defRPr sz="1800"/>
+      </a:pPr>
+      <a:endParaRPr lang="en-US"/>
+    </a:p>
+  </c:txPr>
+  <c:externalData r:id="rId1">
+    <c:autoUpdate val="0"/>
+  </c:externalData>
+</c:chartSpace>
+</file>
+
+<file path=ppt/charts/chart5.xml><?xml version="1.0" encoding="utf-8"?>
+<c:chartSpace xmlns:c="http://schemas.openxmlformats.org/drawingml/2006/chart" xmlns:a="http://schemas.openxmlformats.org/drawingml/2006/main" xmlns:r="http://schemas.openxmlformats.org/officeDocument/2006/relationships">
+  <c:date1904 val="0"/>
+  <c:lang val="en-US"/>
+  <c:roundedCorners val="0"/>
+  <mc:AlternateContent xmlns:mc="http://schemas.openxmlformats.org/markup-compatibility/2006">
+    <mc:Choice xmlns:c14="http://schemas.microsoft.com/office/drawing/2007/8/2/chart" Requires="c14">
+      <c14:style val="118"/>
+    </mc:Choice>
+    <mc:Fallback>
+      <c:style val="18"/>
+    </mc:Fallback>
+  </mc:AlternateContent>
+  <c:chart>
+    <c:autoTitleDeleted val="1"/>
+    <c:plotArea>
+      <c:layout/>
+      <c:scatterChart>
+        <c:scatterStyle val="lineMarker"/>
+        <c:varyColors val="0"/>
+        <c:ser>
+          <c:idx val="0"/>
+          <c:order val="0"/>
+          <c:tx>
+            <c:strRef>
+              <c:f>Sheet1!$B$1</c:f>
+              <c:strCache>
+                <c:ptCount val="1"/>
+                <c:pt idx="0">
+                  <c:v>Y-Value 1</c:v>
+                </c:pt>
+              </c:strCache>
+            </c:strRef>
+          </c:tx>
+          <c:spPr>
+            <a:ln w="47625">
+              <a:noFill/>
+            </a:ln>
+          </c:spPr>
+          <c:xVal>
+            <c:numRef>
+              <c:f>Sheet1!$A$2:$A$4</c:f>
+              <c:numCache>
+                <c:formatCode>General</c:formatCode>
+                <c:ptCount val="3"/>
+                <c:pt idx="0">
+                  <c:v>0.7</c:v>
+                </c:pt>
+                <c:pt idx="1">
+                  <c:v>1.8</c:v>
+                </c:pt>
+                <c:pt idx="2">
+                  <c:v>2.6</c:v>
+                </c:pt>
+              </c:numCache>
+            </c:numRef>
+          </c:xVal>
+          <c:yVal>
+            <c:numRef>
+              <c:f>Sheet1!$B$2:$B$4</c:f>
+              <c:numCache>
+                <c:formatCode>General</c:formatCode>
+                <c:ptCount val="3"/>
+                <c:pt idx="0">
+                  <c:v>2.7</c:v>
+                </c:pt>
+                <c:pt idx="1">
+                  <c:v>3.2</c:v>
+                </c:pt>
+                <c:pt idx="2">
+                  <c:v>0.8</c:v>
+                </c:pt>
+              </c:numCache>
+            </c:numRef>
+          </c:yVal>
+          <c:smooth val="0"/>
+        </c:ser>
+        <c:dLbls>
+          <c:showLegendKey val="0"/>
+          <c:showVal val="0"/>
+          <c:showCatName val="0"/>
+          <c:showSerName val="0"/>
+          <c:showPercent val="0"/>
+          <c:showBubbleSize val="0"/>
+        </c:dLbls>
+        <c:axId val="-2106419928"/>
+        <c:axId val="-2108866872"/>
+      </c:scatterChart>
+      <c:valAx>
+        <c:axId val="-2106419928"/>
+        <c:scaling>
+          <c:orientation val="minMax"/>
+        </c:scaling>
+        <c:delete val="0"/>
+        <c:axPos val="b"/>
+        <c:numFmt formatCode="General" sourceLinked="1"/>
+        <c:majorTickMark val="out"/>
+        <c:minorTickMark val="none"/>
+        <c:tickLblPos val="nextTo"/>
+        <c:crossAx val="-2108866872"/>
+        <c:crossesAt val="2.75"/>
+        <c:crossBetween val="midCat"/>
+      </c:valAx>
+      <c:valAx>
+        <c:axId val="-2108866872"/>
+        <c:scaling>
+          <c:orientation val="minMax"/>
+        </c:scaling>
+        <c:delete val="0"/>
+        <c:axPos val="l"/>
+        <c:majorGridlines/>
+        <c:numFmt formatCode="General" sourceLinked="1"/>
+        <c:majorTickMark val="out"/>
+        <c:minorTickMark val="none"/>
+        <c:tickLblPos val="nextTo"/>
+        <c:crossAx val="-2106419928"/>
+        <c:crosses val="autoZero"/>
+        <c:crossBetween val="midCat"/>
+      </c:valAx>
+    </c:plotArea>
+    <c:plotVisOnly val="1"/>
+    <c:dispBlanksAs val="gap"/>
+    <c:showDLblsOverMax val="0"/>
+  </c:chart>
+  <c:txPr>
+    <a:bodyPr/>
+    <a:lstStyle/>
+    <a:p>
+      <a:pPr>
+        <a:defRPr sz="1800"/>
+      </a:pPr>
+      <a:endParaRPr lang="en-US"/>
+    </a:p>
+  </c:txPr>
+  <c:externalData r:id="rId1">
+    <c:autoUpdate val="0"/>
+  </c:externalData>
+</c:chartSpace>
+</file>
+
+<file path=ppt/charts/chart6.xml><?xml version="1.0" encoding="utf-8"?>
+<c:chartSpace xmlns:c="http://schemas.openxmlformats.org/drawingml/2006/chart" xmlns:a="http://schemas.openxmlformats.org/drawingml/2006/main" xmlns:r="http://schemas.openxmlformats.org/officeDocument/2006/relationships">
+  <c:date1904 val="0"/>
+  <c:lang val="en-US"/>
+  <c:roundedCorners val="0"/>
+  <mc:AlternateContent xmlns:mc="http://schemas.openxmlformats.org/markup-compatibility/2006">
+    <mc:Choice xmlns:c14="http://schemas.microsoft.com/office/drawing/2007/8/2/chart" Requires="c14">
+      <c14:style val="118"/>
+    </mc:Choice>
+    <mc:Fallback>
+      <c:style val="18"/>
+    </mc:Fallback>
+  </mc:AlternateContent>
+  <c:chart>
+    <c:title>
+      <c:layout/>
+      <c:overlay val="0"/>
+    </c:title>
+    <c:autoTitleDeleted val="0"/>
+    <c:plotArea>
+      <c:layout/>
+      <c:bubbleChart>
+        <c:varyColors val="0"/>
+        <c:ser>
+          <c:idx val="0"/>
+          <c:order val="0"/>
+          <c:tx>
+            <c:strRef>
+              <c:f>Sheet1!$B$1</c:f>
+              <c:strCache>
+                <c:ptCount val="1"/>
+                <c:pt idx="0">
+                  <c:v>Y-Value 1</c:v>
+                </c:pt>
+              </c:strCache>
+            </c:strRef>
+          </c:tx>
+          <c:invertIfNegative val="0"/>
+          <c:xVal>
+            <c:numRef>
+              <c:f>Sheet1!$A$2:$A$4</c:f>
+              <c:numCache>
+                <c:formatCode>General</c:formatCode>
+                <c:ptCount val="3"/>
+                <c:pt idx="0">
+                  <c:v>0.7</c:v>
+                </c:pt>
+                <c:pt idx="1">
+                  <c:v>1.8</c:v>
+                </c:pt>
+                <c:pt idx="2">
+                  <c:v>2.6</c:v>
+                </c:pt>
+              </c:numCache>
+            </c:numRef>
+          </c:xVal>
+          <c:yVal>
+            <c:numRef>
+              <c:f>Sheet1!$B$2:$B$4</c:f>
+              <c:numCache>
+                <c:formatCode>General</c:formatCode>
+                <c:ptCount val="3"/>
+                <c:pt idx="0">
+                  <c:v>2.7</c:v>
+                </c:pt>
+                <c:pt idx="1">
+                  <c:v>-3.2</c:v>
+                </c:pt>
+                <c:pt idx="2">
+                  <c:v>0.8</c:v>
+                </c:pt>
+              </c:numCache>
+            </c:numRef>
+          </c:yVal>
+          <c:bubbleSize>
+            <c:numRef>
+              <c:f>Sheet1!$C$2:$C$4</c:f>
+              <c:numCache>
+                <c:formatCode>General</c:formatCode>
+                <c:ptCount val="3"/>
+                <c:pt idx="0">
+                  <c:v>10.0</c:v>
+                </c:pt>
+                <c:pt idx="1">
+                  <c:v>4.0</c:v>
+                </c:pt>
+                <c:pt idx="2">
+                  <c:v>8.0</c:v>
+                </c:pt>
+              </c:numCache>
+            </c:numRef>
+          </c:bubbleSize>
+          <c:bubble3D val="1"/>
+        </c:ser>
+        <c:dLbls>
+          <c:showLegendKey val="0"/>
+          <c:showVal val="0"/>
+          <c:showCatName val="0"/>
+          <c:showSerName val="0"/>
+          <c:showPercent val="0"/>
+          <c:showBubbleSize val="0"/>
+        </c:dLbls>
+        <c:bubbleScale val="100"/>
+        <c:showNegBubbles val="0"/>
+        <c:axId val="-2108895352"/>
+        <c:axId val="-2105782760"/>
+      </c:bubbleChart>
+      <c:valAx>
+        <c:axId val="-2108895352"/>
+        <c:scaling>
+          <c:orientation val="minMax"/>
+        </c:scaling>
+        <c:delete val="0"/>
+        <c:axPos val="b"/>
+        <c:numFmt formatCode="General" sourceLinked="1"/>
+        <c:majorTickMark val="out"/>
+        <c:minorTickMark val="none"/>
+        <c:tickLblPos val="nextTo"/>
+        <c:crossAx val="-2105782760"/>
+        <c:crossesAt val="-1.5"/>
+        <c:crossBetween val="midCat"/>
+      </c:valAx>
+      <c:valAx>
+        <c:axId val="-2105782760"/>
+        <c:scaling>
+          <c:orientation val="minMax"/>
+        </c:scaling>
+        <c:delete val="0"/>
+        <c:axPos val="l"/>
+        <c:majorGridlines/>
+        <c:numFmt formatCode="General" sourceLinked="1"/>
+        <c:majorTickMark val="out"/>
+        <c:minorTickMark val="none"/>
+        <c:tickLblPos val="nextTo"/>
+        <c:crossAx val="-2108895352"/>
+        <c:crosses val="autoZero"/>
+        <c:crossBetween val="midCat"/>
       </c:valAx>
     </c:plotArea>
     <c:legend>
@@ -1047,6 +1704,214 @@
 </p:sld>
 </file>
 
+<file path=ppt/slides/slide3.xml><?xml version="1.0" encoding="utf-8"?>
+<p:sld xmlns:a="http://schemas.openxmlformats.org/drawingml/2006/main" xmlns:r="http://schemas.openxmlformats.org/officeDocument/2006/relationships" xmlns:p="http://schemas.openxmlformats.org/presentationml/2006/main">
+  <p:cSld>
+    <p:spTree>
+      <p:nvGrpSpPr>
+        <p:cNvPr id="1" name=""/>
+        <p:cNvGrpSpPr/>
+        <p:nvPr/>
+      </p:nvGrpSpPr>
+      <p:grpSpPr>
+        <a:xfrm>
+          <a:off x="0" y="0"/>
+          <a:ext cx="0" cy="0"/>
+          <a:chOff x="0" y="0"/>
+          <a:chExt cx="0" cy="0"/>
+        </a:xfrm>
+      </p:grpSpPr>
+      <p:graphicFrame>
+        <p:nvGraphicFramePr>
+          <p:cNvPr id="2" name="Chart 1"/>
+          <p:cNvGraphicFramePr/>
+          <p:nvPr>
+            <p:extLst>
+              <p:ext uri="{D42A27DB-BD31-4B8C-83A1-F6EECF244321}">
+                <p14:modId xmlns:p14="http://schemas.microsoft.com/office/powerpoint/2010/main" val="3289893281"/>
+              </p:ext>
+            </p:extLst>
+          </p:nvPr>
+        </p:nvGraphicFramePr>
+        <p:xfrm>
+          <a:off x="1524000" y="1397000"/>
+          <a:ext cx="6096000" cy="4064000"/>
+        </p:xfrm>
+        <a:graphic>
+          <a:graphicData uri="http://schemas.openxmlformats.org/drawingml/2006/chart">
+            <c:chart xmlns:c="http://schemas.openxmlformats.org/drawingml/2006/chart" xmlns:r="http://schemas.openxmlformats.org/officeDocument/2006/relationships" r:id="rId2"/>
+          </a:graphicData>
+        </a:graphic>
+      </p:graphicFrame>
+    </p:spTree>
+    <p:extLst>
+      <p:ext uri="{BB962C8B-B14F-4D97-AF65-F5344CB8AC3E}">
+        <p14:creationId xmlns:p14="http://schemas.microsoft.com/office/powerpoint/2010/main" val="2887379343"/>
+      </p:ext>
+    </p:extLst>
+  </p:cSld>
+  <p:clrMapOvr>
+    <a:masterClrMapping/>
+  </p:clrMapOvr>
+</p:sld>
+</file>
+
+<file path=ppt/slides/slide4.xml><?xml version="1.0" encoding="utf-8"?>
+<p:sld xmlns:a="http://schemas.openxmlformats.org/drawingml/2006/main" xmlns:r="http://schemas.openxmlformats.org/officeDocument/2006/relationships" xmlns:p="http://schemas.openxmlformats.org/presentationml/2006/main">
+  <p:cSld>
+    <p:spTree>
+      <p:nvGrpSpPr>
+        <p:cNvPr id="1" name=""/>
+        <p:cNvGrpSpPr/>
+        <p:nvPr/>
+      </p:nvGrpSpPr>
+      <p:grpSpPr>
+        <a:xfrm>
+          <a:off x="0" y="0"/>
+          <a:ext cx="0" cy="0"/>
+          <a:chOff x="0" y="0"/>
+          <a:chExt cx="0" cy="0"/>
+        </a:xfrm>
+      </p:grpSpPr>
+      <p:graphicFrame>
+        <p:nvGraphicFramePr>
+          <p:cNvPr id="2" name="Chart 1"/>
+          <p:cNvGraphicFramePr/>
+          <p:nvPr>
+            <p:extLst>
+              <p:ext uri="{D42A27DB-BD31-4B8C-83A1-F6EECF244321}">
+                <p14:modId xmlns:p14="http://schemas.microsoft.com/office/powerpoint/2010/main" val="1094900692"/>
+              </p:ext>
+            </p:extLst>
+          </p:nvPr>
+        </p:nvGraphicFramePr>
+        <p:xfrm>
+          <a:off x="1524000" y="1397000"/>
+          <a:ext cx="6096000" cy="4064000"/>
+        </p:xfrm>
+        <a:graphic>
+          <a:graphicData uri="http://schemas.openxmlformats.org/drawingml/2006/chart">
+            <c:chart xmlns:c="http://schemas.openxmlformats.org/drawingml/2006/chart" xmlns:r="http://schemas.openxmlformats.org/officeDocument/2006/relationships" r:id="rId2"/>
+          </a:graphicData>
+        </a:graphic>
+      </p:graphicFrame>
+    </p:spTree>
+    <p:extLst>
+      <p:ext uri="{BB962C8B-B14F-4D97-AF65-F5344CB8AC3E}">
+        <p14:creationId xmlns:p14="http://schemas.microsoft.com/office/powerpoint/2010/main" val="761326446"/>
+      </p:ext>
+    </p:extLst>
+  </p:cSld>
+  <p:clrMapOvr>
+    <a:masterClrMapping/>
+  </p:clrMapOvr>
+</p:sld>
+</file>
+
+<file path=ppt/slides/slide5.xml><?xml version="1.0" encoding="utf-8"?>
+<p:sld xmlns:a="http://schemas.openxmlformats.org/drawingml/2006/main" xmlns:r="http://schemas.openxmlformats.org/officeDocument/2006/relationships" xmlns:p="http://schemas.openxmlformats.org/presentationml/2006/main">
+  <p:cSld>
+    <p:spTree>
+      <p:nvGrpSpPr>
+        <p:cNvPr id="1" name=""/>
+        <p:cNvGrpSpPr/>
+        <p:nvPr/>
+      </p:nvGrpSpPr>
+      <p:grpSpPr>
+        <a:xfrm>
+          <a:off x="0" y="0"/>
+          <a:ext cx="0" cy="0"/>
+          <a:chOff x="0" y="0"/>
+          <a:chExt cx="0" cy="0"/>
+        </a:xfrm>
+      </p:grpSpPr>
+      <p:graphicFrame>
+        <p:nvGraphicFramePr>
+          <p:cNvPr id="2" name="Chart 1"/>
+          <p:cNvGraphicFramePr/>
+          <p:nvPr>
+            <p:extLst>
+              <p:ext uri="{D42A27DB-BD31-4B8C-83A1-F6EECF244321}">
+                <p14:modId xmlns:p14="http://schemas.microsoft.com/office/powerpoint/2010/main" val="2510433423"/>
+              </p:ext>
+            </p:extLst>
+          </p:nvPr>
+        </p:nvGraphicFramePr>
+        <p:xfrm>
+          <a:off x="1524000" y="1397000"/>
+          <a:ext cx="6096000" cy="4064000"/>
+        </p:xfrm>
+        <a:graphic>
+          <a:graphicData uri="http://schemas.openxmlformats.org/drawingml/2006/chart">
+            <c:chart xmlns:c="http://schemas.openxmlformats.org/drawingml/2006/chart" xmlns:r="http://schemas.openxmlformats.org/officeDocument/2006/relationships" r:id="rId2"/>
+          </a:graphicData>
+        </a:graphic>
+      </p:graphicFrame>
+    </p:spTree>
+    <p:extLst>
+      <p:ext uri="{BB962C8B-B14F-4D97-AF65-F5344CB8AC3E}">
+        <p14:creationId xmlns:p14="http://schemas.microsoft.com/office/powerpoint/2010/main" val="457917759"/>
+      </p:ext>
+    </p:extLst>
+  </p:cSld>
+  <p:clrMapOvr>
+    <a:masterClrMapping/>
+  </p:clrMapOvr>
+</p:sld>
+</file>
+
+<file path=ppt/slides/slide6.xml><?xml version="1.0" encoding="utf-8"?>
+<p:sld xmlns:a="http://schemas.openxmlformats.org/drawingml/2006/main" xmlns:r="http://schemas.openxmlformats.org/officeDocument/2006/relationships" xmlns:p="http://schemas.openxmlformats.org/presentationml/2006/main">
+  <p:cSld>
+    <p:spTree>
+      <p:nvGrpSpPr>
+        <p:cNvPr id="1" name=""/>
+        <p:cNvGrpSpPr/>
+        <p:nvPr/>
+      </p:nvGrpSpPr>
+      <p:grpSpPr>
+        <a:xfrm>
+          <a:off x="0" y="0"/>
+          <a:ext cx="0" cy="0"/>
+          <a:chOff x="0" y="0"/>
+          <a:chExt cx="0" cy="0"/>
+        </a:xfrm>
+      </p:grpSpPr>
+      <p:graphicFrame>
+        <p:nvGraphicFramePr>
+          <p:cNvPr id="3" name="Chart 2"/>
+          <p:cNvGraphicFramePr/>
+          <p:nvPr>
+            <p:extLst>
+              <p:ext uri="{D42A27DB-BD31-4B8C-83A1-F6EECF244321}">
+                <p14:modId xmlns:p14="http://schemas.microsoft.com/office/powerpoint/2010/main" val="3456402211"/>
+              </p:ext>
+            </p:extLst>
+          </p:nvPr>
+        </p:nvGraphicFramePr>
+        <p:xfrm>
+          <a:off x="1524000" y="1397000"/>
+          <a:ext cx="6096000" cy="4064000"/>
+        </p:xfrm>
+        <a:graphic>
+          <a:graphicData uri="http://schemas.openxmlformats.org/drawingml/2006/chart">
+            <c:chart xmlns:c="http://schemas.openxmlformats.org/drawingml/2006/chart" xmlns:r="http://schemas.openxmlformats.org/officeDocument/2006/relationships" r:id="rId2"/>
+          </a:graphicData>
+        </a:graphic>
+      </p:graphicFrame>
+    </p:spTree>
+    <p:extLst>
+      <p:ext uri="{BB962C8B-B14F-4D97-AF65-F5344CB8AC3E}">
+        <p14:creationId xmlns:p14="http://schemas.microsoft.com/office/powerpoint/2010/main" val="3217326214"/>
+      </p:ext>
+    </p:extLst>
+  </p:cSld>
+  <p:clrMapOvr>
+    <a:masterClrMapping/>
+  </p:clrMapOvr>
+</p:sld>
+</file>
+
 <file path=ppt/theme/theme1.xml><?xml version="1.0" encoding="utf-8"?>
 <a:theme xmlns:a="http://schemas.openxmlformats.org/drawingml/2006/main" name="Office Theme">
   <a:themeElements>

</xml_diff>

<commit_message>
acpt: add scenarios for Axis.category_type
</commit_message>
<xml_diff>
--- a/features/steps/test_files/cht-axis-props.pptx
+++ b/features/steps/test_files/cht-axis-props.pptx
@@ -11,6 +11,7 @@
     <p:sldId id="261" r:id="rId5"/>
     <p:sldId id="258" r:id="rId6"/>
     <p:sldId id="259" r:id="rId7"/>
+    <p:sldId id="262" r:id="rId8"/>
   </p:sldIdLst>
   <p:sldSz cx="9144000" cy="6858000" type="screen4x3"/>
   <p:notesSz cx="6858000" cy="9144000"/>
@@ -313,11 +314,11 @@
           <c:showBubbleSize val="0"/>
         </c:dLbls>
         <c:gapWidth val="150"/>
-        <c:axId val="-2096221016"/>
-        <c:axId val="2053160680"/>
+        <c:axId val="-2146921720"/>
+        <c:axId val="-2146942840"/>
       </c:barChart>
       <c:catAx>
-        <c:axId val="-2096221016"/>
+        <c:axId val="-2146921720"/>
         <c:scaling>
           <c:orientation val="minMax"/>
         </c:scaling>
@@ -326,7 +327,7 @@
         <c:majorTickMark val="out"/>
         <c:minorTickMark val="none"/>
         <c:tickLblPos val="nextTo"/>
-        <c:crossAx val="2053160680"/>
+        <c:crossAx val="-2146942840"/>
         <c:crosses val="autoZero"/>
         <c:auto val="1"/>
         <c:lblAlgn val="ctr"/>
@@ -334,7 +335,7 @@
         <c:noMultiLvlLbl val="0"/>
       </c:catAx>
       <c:valAx>
-        <c:axId val="2053160680"/>
+        <c:axId val="-2146942840"/>
         <c:scaling>
           <c:orientation val="minMax"/>
         </c:scaling>
@@ -346,7 +347,7 @@
         <c:majorTickMark val="out"/>
         <c:minorTickMark val="none"/>
         <c:tickLblPos val="nextTo"/>
-        <c:crossAx val="-2096221016"/>
+        <c:crossAx val="-2146921720"/>
         <c:crosses val="autoZero"/>
         <c:crossBetween val="between"/>
       </c:valAx>
@@ -577,11 +578,11 @@
           <c:showBubbleSize val="0"/>
         </c:dLbls>
         <c:gapWidth val="150"/>
-        <c:axId val="-2106446296"/>
-        <c:axId val="-2109040920"/>
+        <c:axId val="-2102119880"/>
+        <c:axId val="-2099448312"/>
       </c:barChart>
       <c:catAx>
-        <c:axId val="-2106446296"/>
+        <c:axId val="-2102119880"/>
         <c:scaling>
           <c:orientation val="minMax"/>
         </c:scaling>
@@ -590,7 +591,7 @@
         <c:majorTickMark val="out"/>
         <c:minorTickMark val="none"/>
         <c:tickLblPos val="nextTo"/>
-        <c:crossAx val="-2109040920"/>
+        <c:crossAx val="-2099448312"/>
         <c:crosses val="autoZero"/>
         <c:auto val="1"/>
         <c:lblAlgn val="ctr"/>
@@ -598,7 +599,7 @@
         <c:noMultiLvlLbl val="0"/>
       </c:catAx>
       <c:valAx>
-        <c:axId val="-2109040920"/>
+        <c:axId val="-2099448312"/>
         <c:scaling>
           <c:orientation val="minMax"/>
         </c:scaling>
@@ -609,7 +610,7 @@
         <c:majorTickMark val="out"/>
         <c:minorTickMark val="out"/>
         <c:tickLblPos val="nextTo"/>
-        <c:crossAx val="-2106446296"/>
+        <c:crossAx val="-2102119880"/>
         <c:crosses val="autoZero"/>
         <c:crossBetween val="between"/>
         <c:majorUnit val="20.0"/>
@@ -756,11 +757,11 @@
           <c:showPercent val="0"/>
           <c:showBubbleSize val="0"/>
         </c:dLbls>
-        <c:axId val="-2054914440"/>
-        <c:axId val="-2054303352"/>
+        <c:axId val="-2102261768"/>
+        <c:axId val="-2099695624"/>
       </c:scatterChart>
       <c:valAx>
-        <c:axId val="-2054914440"/>
+        <c:axId val="-2102261768"/>
         <c:scaling>
           <c:orientation val="minMax"/>
         </c:scaling>
@@ -770,12 +771,12 @@
         <c:majorTickMark val="out"/>
         <c:minorTickMark val="none"/>
         <c:tickLblPos val="nextTo"/>
-        <c:crossAx val="-2054303352"/>
+        <c:crossAx val="-2099695624"/>
         <c:crosses val="max"/>
         <c:crossBetween val="midCat"/>
       </c:valAx>
       <c:valAx>
-        <c:axId val="-2054303352"/>
+        <c:axId val="-2099695624"/>
         <c:scaling>
           <c:orientation val="minMax"/>
         </c:scaling>
@@ -786,7 +787,7 @@
         <c:majorTickMark val="out"/>
         <c:minorTickMark val="none"/>
         <c:tickLblPos val="nextTo"/>
-        <c:crossAx val="-2054914440"/>
+        <c:crossAx val="-2102261768"/>
         <c:crosses val="autoZero"/>
         <c:crossBetween val="midCat"/>
       </c:valAx>
@@ -935,11 +936,11 @@
         </c:dLbls>
         <c:bubbleScale val="100"/>
         <c:showNegBubbles val="0"/>
-        <c:axId val="-2054634472"/>
-        <c:axId val="-2113201512"/>
+        <c:axId val="-2141259496"/>
+        <c:axId val="-2102264072"/>
       </c:bubbleChart>
       <c:valAx>
-        <c:axId val="-2054634472"/>
+        <c:axId val="-2141259496"/>
         <c:scaling>
           <c:orientation val="minMax"/>
         </c:scaling>
@@ -949,12 +950,12 @@
         <c:majorTickMark val="out"/>
         <c:minorTickMark val="none"/>
         <c:tickLblPos val="nextTo"/>
-        <c:crossAx val="-2113201512"/>
+        <c:crossAx val="-2102264072"/>
         <c:crosses val="min"/>
         <c:crossBetween val="midCat"/>
       </c:valAx>
       <c:valAx>
-        <c:axId val="-2113201512"/>
+        <c:axId val="-2102264072"/>
         <c:scaling>
           <c:orientation val="minMax"/>
         </c:scaling>
@@ -965,7 +966,7 @@
         <c:majorTickMark val="out"/>
         <c:minorTickMark val="none"/>
         <c:tickLblPos val="nextTo"/>
-        <c:crossAx val="-2054634472"/>
+        <c:crossAx val="-2141259496"/>
         <c:crosses val="autoZero"/>
         <c:crossBetween val="midCat"/>
       </c:valAx>
@@ -1075,11 +1076,11 @@
           <c:showPercent val="0"/>
           <c:showBubbleSize val="0"/>
         </c:dLbls>
-        <c:axId val="-2106419928"/>
-        <c:axId val="-2108866872"/>
+        <c:axId val="-2102272760"/>
+        <c:axId val="-2141802216"/>
       </c:scatterChart>
       <c:valAx>
-        <c:axId val="-2106419928"/>
+        <c:axId val="-2102272760"/>
         <c:scaling>
           <c:orientation val="minMax"/>
         </c:scaling>
@@ -1089,12 +1090,12 @@
         <c:majorTickMark val="out"/>
         <c:minorTickMark val="none"/>
         <c:tickLblPos val="nextTo"/>
-        <c:crossAx val="-2108866872"/>
+        <c:crossAx val="-2141802216"/>
         <c:crossesAt val="2.75"/>
         <c:crossBetween val="midCat"/>
       </c:valAx>
       <c:valAx>
-        <c:axId val="-2108866872"/>
+        <c:axId val="-2141802216"/>
         <c:scaling>
           <c:orientation val="minMax"/>
         </c:scaling>
@@ -1105,7 +1106,7 @@
         <c:majorTickMark val="out"/>
         <c:minorTickMark val="none"/>
         <c:tickLblPos val="nextTo"/>
-        <c:crossAx val="-2106419928"/>
+        <c:crossAx val="-2102272760"/>
         <c:crosses val="autoZero"/>
         <c:crossBetween val="midCat"/>
       </c:valAx>
@@ -1234,11 +1235,11 @@
         </c:dLbls>
         <c:bubbleScale val="100"/>
         <c:showNegBubbles val="0"/>
-        <c:axId val="-2108895352"/>
-        <c:axId val="-2105782760"/>
+        <c:axId val="-2102176456"/>
+        <c:axId val="-2142190120"/>
       </c:bubbleChart>
       <c:valAx>
-        <c:axId val="-2108895352"/>
+        <c:axId val="-2102176456"/>
         <c:scaling>
           <c:orientation val="minMax"/>
         </c:scaling>
@@ -1248,12 +1249,12 @@
         <c:majorTickMark val="out"/>
         <c:minorTickMark val="none"/>
         <c:tickLblPos val="nextTo"/>
-        <c:crossAx val="-2105782760"/>
+        <c:crossAx val="-2142190120"/>
         <c:crossesAt val="-1.5"/>
         <c:crossBetween val="midCat"/>
       </c:valAx>
       <c:valAx>
-        <c:axId val="-2105782760"/>
+        <c:axId val="-2142190120"/>
         <c:scaling>
           <c:orientation val="minMax"/>
         </c:scaling>
@@ -1264,9 +1265,184 @@
         <c:majorTickMark val="out"/>
         <c:minorTickMark val="none"/>
         <c:tickLblPos val="nextTo"/>
-        <c:crossAx val="-2108895352"/>
+        <c:crossAx val="-2102176456"/>
         <c:crosses val="autoZero"/>
         <c:crossBetween val="midCat"/>
+      </c:valAx>
+    </c:plotArea>
+    <c:legend>
+      <c:legendPos val="r"/>
+      <c:layout/>
+      <c:overlay val="0"/>
+    </c:legend>
+    <c:plotVisOnly val="1"/>
+    <c:dispBlanksAs val="gap"/>
+    <c:showDLblsOverMax val="0"/>
+  </c:chart>
+  <c:txPr>
+    <a:bodyPr/>
+    <a:lstStyle/>
+    <a:p>
+      <a:pPr>
+        <a:defRPr sz="1800"/>
+      </a:pPr>
+      <a:endParaRPr lang="en-US"/>
+    </a:p>
+  </c:txPr>
+  <c:externalData r:id="rId1">
+    <c:autoUpdate val="0"/>
+  </c:externalData>
+</c:chartSpace>
+</file>
+
+<file path=ppt/charts/chart7.xml><?xml version="1.0" encoding="utf-8"?>
+<c:chartSpace xmlns:c="http://schemas.openxmlformats.org/drawingml/2006/chart" xmlns:a="http://schemas.openxmlformats.org/drawingml/2006/main" xmlns:r="http://schemas.openxmlformats.org/officeDocument/2006/relationships">
+  <c:date1904 val="0"/>
+  <c:lang val="en-US"/>
+  <c:roundedCorners val="0"/>
+  <mc:AlternateContent xmlns:mc="http://schemas.openxmlformats.org/markup-compatibility/2006">
+    <mc:Choice xmlns:c14="http://schemas.microsoft.com/office/drawing/2007/8/2/chart" Requires="c14">
+      <c14:style val="118"/>
+    </mc:Choice>
+    <mc:Fallback>
+      <c:style val="18"/>
+    </mc:Fallback>
+  </mc:AlternateContent>
+  <c:chart>
+    <c:title>
+      <c:layout/>
+      <c:overlay val="0"/>
+    </c:title>
+    <c:autoTitleDeleted val="0"/>
+    <c:plotArea>
+      <c:layout/>
+      <c:lineChart>
+        <c:grouping val="standard"/>
+        <c:varyColors val="0"/>
+        <c:ser>
+          <c:idx val="0"/>
+          <c:order val="0"/>
+          <c:tx>
+            <c:strRef>
+              <c:f>Sheet1!$B$1</c:f>
+              <c:strCache>
+                <c:ptCount val="1"/>
+                <c:pt idx="0">
+                  <c:v>Series 1</c:v>
+                </c:pt>
+              </c:strCache>
+            </c:strRef>
+          </c:tx>
+          <c:marker>
+            <c:symbol val="none"/>
+          </c:marker>
+          <c:cat>
+            <c:numRef>
+              <c:f>Sheet1!$A$2:$A$8</c:f>
+              <c:numCache>
+                <c:formatCode>m/d/yy</c:formatCode>
+                <c:ptCount val="7"/>
+                <c:pt idx="0">
+                  <c:v>25204.0</c:v>
+                </c:pt>
+                <c:pt idx="1">
+                  <c:v>25205.0</c:v>
+                </c:pt>
+                <c:pt idx="2">
+                  <c:v>25215.0</c:v>
+                </c:pt>
+                <c:pt idx="3">
+                  <c:v>25223.0</c:v>
+                </c:pt>
+                <c:pt idx="4">
+                  <c:v>25233.0</c:v>
+                </c:pt>
+                <c:pt idx="5">
+                  <c:v>25244.0</c:v>
+                </c:pt>
+                <c:pt idx="6">
+                  <c:v>25254.0</c:v>
+                </c:pt>
+              </c:numCache>
+            </c:numRef>
+          </c:cat>
+          <c:val>
+            <c:numRef>
+              <c:f>Sheet1!$B$2:$B$8</c:f>
+              <c:numCache>
+                <c:formatCode>General</c:formatCode>
+                <c:ptCount val="7"/>
+                <c:pt idx="0">
+                  <c:v>4.3</c:v>
+                </c:pt>
+                <c:pt idx="1">
+                  <c:v>2.5</c:v>
+                </c:pt>
+                <c:pt idx="2">
+                  <c:v>3.5</c:v>
+                </c:pt>
+                <c:pt idx="3">
+                  <c:v>4.5</c:v>
+                </c:pt>
+                <c:pt idx="4">
+                  <c:v>3.6</c:v>
+                </c:pt>
+                <c:pt idx="5">
+                  <c:v>15.0</c:v>
+                </c:pt>
+                <c:pt idx="6">
+                  <c:v>17.0</c:v>
+                </c:pt>
+              </c:numCache>
+            </c:numRef>
+          </c:val>
+          <c:smooth val="0"/>
+        </c:ser>
+        <c:dLbls>
+          <c:showLegendKey val="0"/>
+          <c:showVal val="0"/>
+          <c:showCatName val="0"/>
+          <c:showSerName val="0"/>
+          <c:showPercent val="0"/>
+          <c:showBubbleSize val="0"/>
+        </c:dLbls>
+        <c:marker val="1"/>
+        <c:smooth val="0"/>
+        <c:axId val="-2079177912"/>
+        <c:axId val="-2079174840"/>
+      </c:lineChart>
+      <c:dateAx>
+        <c:axId val="-2079177912"/>
+        <c:scaling>
+          <c:orientation val="minMax"/>
+        </c:scaling>
+        <c:delete val="0"/>
+        <c:axPos val="b"/>
+        <c:numFmt formatCode="m/d/yy" sourceLinked="1"/>
+        <c:majorTickMark val="out"/>
+        <c:minorTickMark val="none"/>
+        <c:tickLblPos val="nextTo"/>
+        <c:crossAx val="-2079174840"/>
+        <c:crosses val="autoZero"/>
+        <c:auto val="1"/>
+        <c:lblOffset val="100"/>
+        <c:baseTimeUnit val="days"/>
+      </c:dateAx>
+      <c:valAx>
+        <c:axId val="-2079174840"/>
+        <c:scaling>
+          <c:orientation val="minMax"/>
+        </c:scaling>
+        <c:delete val="0"/>
+        <c:axPos val="l"/>
+        <c:majorGridlines/>
+        <c:numFmt formatCode="General" sourceLinked="1"/>
+        <c:majorTickMark val="out"/>
+        <c:minorTickMark val="none"/>
+        <c:tickLblPos val="nextTo"/>
+        <c:crossAx val="-2079177912"/>
+        <c:crosses val="autoZero"/>
+        <c:crossBetween val="between"/>
       </c:valAx>
     </c:plotArea>
     <c:legend>
@@ -1912,6 +2088,58 @@
 </p:sld>
 </file>
 
+<file path=ppt/slides/slide7.xml><?xml version="1.0" encoding="utf-8"?>
+<p:sld xmlns:a="http://schemas.openxmlformats.org/drawingml/2006/main" xmlns:r="http://schemas.openxmlformats.org/officeDocument/2006/relationships" xmlns:p="http://schemas.openxmlformats.org/presentationml/2006/main">
+  <p:cSld>
+    <p:spTree>
+      <p:nvGrpSpPr>
+        <p:cNvPr id="1" name=""/>
+        <p:cNvGrpSpPr/>
+        <p:nvPr/>
+      </p:nvGrpSpPr>
+      <p:grpSpPr>
+        <a:xfrm>
+          <a:off x="0" y="0"/>
+          <a:ext cx="0" cy="0"/>
+          <a:chOff x="0" y="0"/>
+          <a:chExt cx="0" cy="0"/>
+        </a:xfrm>
+      </p:grpSpPr>
+      <p:graphicFrame>
+        <p:nvGraphicFramePr>
+          <p:cNvPr id="2" name="Chart 1"/>
+          <p:cNvGraphicFramePr/>
+          <p:nvPr>
+            <p:extLst>
+              <p:ext uri="{D42A27DB-BD31-4B8C-83A1-F6EECF244321}">
+                <p14:modId xmlns:p14="http://schemas.microsoft.com/office/powerpoint/2010/main" val="83020541"/>
+              </p:ext>
+            </p:extLst>
+          </p:nvPr>
+        </p:nvGraphicFramePr>
+        <p:xfrm>
+          <a:off x="251520" y="260648"/>
+          <a:ext cx="8568952" cy="6264696"/>
+        </p:xfrm>
+        <a:graphic>
+          <a:graphicData uri="http://schemas.openxmlformats.org/drawingml/2006/chart">
+            <c:chart xmlns:c="http://schemas.openxmlformats.org/drawingml/2006/chart" xmlns:r="http://schemas.openxmlformats.org/officeDocument/2006/relationships" r:id="rId2"/>
+          </a:graphicData>
+        </a:graphic>
+      </p:graphicFrame>
+    </p:spTree>
+    <p:extLst>
+      <p:ext uri="{BB962C8B-B14F-4D97-AF65-F5344CB8AC3E}">
+        <p14:creationId xmlns:p14="http://schemas.microsoft.com/office/powerpoint/2010/main" val="4222714733"/>
+      </p:ext>
+    </p:extLst>
+  </p:cSld>
+  <p:clrMapOvr>
+    <a:masterClrMapping/>
+  </p:clrMapOvr>
+</p:sld>
+</file>
+
 <file path=ppt/theme/theme1.xml><?xml version="1.0" encoding="utf-8"?>
 <a:theme xmlns:a="http://schemas.openxmlformats.org/drawingml/2006/main" name="Office Theme">
   <a:themeElements>

</xml_diff>

<commit_message>
acpt: add scenarios for Axis.has_title
</commit_message>
<xml_diff>
--- a/features/steps/test_files/cht-axis-props.pptx
+++ b/features/steps/test_files/cht-axis-props.pptx
@@ -12,6 +12,7 @@
     <p:sldId id="258" r:id="rId6"/>
     <p:sldId id="259" r:id="rId7"/>
     <p:sldId id="262" r:id="rId8"/>
+    <p:sldId id="263" r:id="rId9"/>
   </p:sldIdLst>
   <p:sldSz cx="9144000" cy="6858000" type="screen4x3"/>
   <p:notesSz cx="6858000" cy="9144000"/>
@@ -314,11 +315,11 @@
           <c:showBubbleSize val="0"/>
         </c:dLbls>
         <c:gapWidth val="150"/>
-        <c:axId val="-2146921720"/>
-        <c:axId val="-2146942840"/>
+        <c:axId val="2103860584"/>
+        <c:axId val="2104099768"/>
       </c:barChart>
       <c:catAx>
-        <c:axId val="-2146921720"/>
+        <c:axId val="2103860584"/>
         <c:scaling>
           <c:orientation val="minMax"/>
         </c:scaling>
@@ -327,7 +328,7 @@
         <c:majorTickMark val="out"/>
         <c:minorTickMark val="none"/>
         <c:tickLblPos val="nextTo"/>
-        <c:crossAx val="-2146942840"/>
+        <c:crossAx val="2104099768"/>
         <c:crosses val="autoZero"/>
         <c:auto val="1"/>
         <c:lblAlgn val="ctr"/>
@@ -335,7 +336,7 @@
         <c:noMultiLvlLbl val="0"/>
       </c:catAx>
       <c:valAx>
-        <c:axId val="-2146942840"/>
+        <c:axId val="2104099768"/>
         <c:scaling>
           <c:orientation val="minMax"/>
         </c:scaling>
@@ -347,7 +348,7 @@
         <c:majorTickMark val="out"/>
         <c:minorTickMark val="none"/>
         <c:tickLblPos val="nextTo"/>
-        <c:crossAx val="-2146921720"/>
+        <c:crossAx val="2103860584"/>
         <c:crosses val="autoZero"/>
         <c:crossBetween val="between"/>
       </c:valAx>
@@ -578,11 +579,11 @@
           <c:showBubbleSize val="0"/>
         </c:dLbls>
         <c:gapWidth val="150"/>
-        <c:axId val="-2102119880"/>
-        <c:axId val="-2099448312"/>
+        <c:axId val="-2046209464"/>
+        <c:axId val="-2046107960"/>
       </c:barChart>
       <c:catAx>
-        <c:axId val="-2102119880"/>
+        <c:axId val="-2046209464"/>
         <c:scaling>
           <c:orientation val="minMax"/>
         </c:scaling>
@@ -591,7 +592,7 @@
         <c:majorTickMark val="out"/>
         <c:minorTickMark val="none"/>
         <c:tickLblPos val="nextTo"/>
-        <c:crossAx val="-2099448312"/>
+        <c:crossAx val="-2046107960"/>
         <c:crosses val="autoZero"/>
         <c:auto val="1"/>
         <c:lblAlgn val="ctr"/>
@@ -599,7 +600,7 @@
         <c:noMultiLvlLbl val="0"/>
       </c:catAx>
       <c:valAx>
-        <c:axId val="-2099448312"/>
+        <c:axId val="-2046107960"/>
         <c:scaling>
           <c:orientation val="minMax"/>
         </c:scaling>
@@ -610,7 +611,7 @@
         <c:majorTickMark val="out"/>
         <c:minorTickMark val="out"/>
         <c:tickLblPos val="nextTo"/>
-        <c:crossAx val="-2102119880"/>
+        <c:crossAx val="-2046209464"/>
         <c:crosses val="autoZero"/>
         <c:crossBetween val="between"/>
         <c:majorUnit val="20.0"/>
@@ -757,11 +758,11 @@
           <c:showPercent val="0"/>
           <c:showBubbleSize val="0"/>
         </c:dLbls>
-        <c:axId val="-2102261768"/>
-        <c:axId val="-2099695624"/>
+        <c:axId val="-2045534152"/>
+        <c:axId val="-2045541288"/>
       </c:scatterChart>
       <c:valAx>
-        <c:axId val="-2102261768"/>
+        <c:axId val="-2045534152"/>
         <c:scaling>
           <c:orientation val="minMax"/>
         </c:scaling>
@@ -771,12 +772,12 @@
         <c:majorTickMark val="out"/>
         <c:minorTickMark val="none"/>
         <c:tickLblPos val="nextTo"/>
-        <c:crossAx val="-2099695624"/>
+        <c:crossAx val="-2045541288"/>
         <c:crosses val="max"/>
         <c:crossBetween val="midCat"/>
       </c:valAx>
       <c:valAx>
-        <c:axId val="-2099695624"/>
+        <c:axId val="-2045541288"/>
         <c:scaling>
           <c:orientation val="minMax"/>
         </c:scaling>
@@ -787,7 +788,7 @@
         <c:majorTickMark val="out"/>
         <c:minorTickMark val="none"/>
         <c:tickLblPos val="nextTo"/>
-        <c:crossAx val="-2102261768"/>
+        <c:crossAx val="-2045534152"/>
         <c:crosses val="autoZero"/>
         <c:crossBetween val="midCat"/>
       </c:valAx>
@@ -936,11 +937,11 @@
         </c:dLbls>
         <c:bubbleScale val="100"/>
         <c:showNegBubbles val="0"/>
-        <c:axId val="-2141259496"/>
-        <c:axId val="-2102264072"/>
+        <c:axId val="-2045434456"/>
+        <c:axId val="-2044798040"/>
       </c:bubbleChart>
       <c:valAx>
-        <c:axId val="-2141259496"/>
+        <c:axId val="-2045434456"/>
         <c:scaling>
           <c:orientation val="minMax"/>
         </c:scaling>
@@ -950,12 +951,12 @@
         <c:majorTickMark val="out"/>
         <c:minorTickMark val="none"/>
         <c:tickLblPos val="nextTo"/>
-        <c:crossAx val="-2102264072"/>
+        <c:crossAx val="-2044798040"/>
         <c:crosses val="min"/>
         <c:crossBetween val="midCat"/>
       </c:valAx>
       <c:valAx>
-        <c:axId val="-2102264072"/>
+        <c:axId val="-2044798040"/>
         <c:scaling>
           <c:orientation val="minMax"/>
         </c:scaling>
@@ -966,7 +967,7 @@
         <c:majorTickMark val="out"/>
         <c:minorTickMark val="none"/>
         <c:tickLblPos val="nextTo"/>
-        <c:crossAx val="-2141259496"/>
+        <c:crossAx val="-2045434456"/>
         <c:crosses val="autoZero"/>
         <c:crossBetween val="midCat"/>
       </c:valAx>
@@ -1076,11 +1077,11 @@
           <c:showPercent val="0"/>
           <c:showBubbleSize val="0"/>
         </c:dLbls>
-        <c:axId val="-2102272760"/>
-        <c:axId val="-2141802216"/>
+        <c:axId val="-2069111256"/>
+        <c:axId val="-2045052840"/>
       </c:scatterChart>
       <c:valAx>
-        <c:axId val="-2102272760"/>
+        <c:axId val="-2069111256"/>
         <c:scaling>
           <c:orientation val="minMax"/>
         </c:scaling>
@@ -1090,12 +1091,12 @@
         <c:majorTickMark val="out"/>
         <c:minorTickMark val="none"/>
         <c:tickLblPos val="nextTo"/>
-        <c:crossAx val="-2141802216"/>
+        <c:crossAx val="-2045052840"/>
         <c:crossesAt val="2.75"/>
         <c:crossBetween val="midCat"/>
       </c:valAx>
       <c:valAx>
-        <c:axId val="-2141802216"/>
+        <c:axId val="-2045052840"/>
         <c:scaling>
           <c:orientation val="minMax"/>
         </c:scaling>
@@ -1106,7 +1107,7 @@
         <c:majorTickMark val="out"/>
         <c:minorTickMark val="none"/>
         <c:tickLblPos val="nextTo"/>
-        <c:crossAx val="-2102272760"/>
+        <c:crossAx val="-2069111256"/>
         <c:crosses val="autoZero"/>
         <c:crossBetween val="midCat"/>
       </c:valAx>
@@ -1235,11 +1236,11 @@
         </c:dLbls>
         <c:bubbleScale val="100"/>
         <c:showNegBubbles val="0"/>
-        <c:axId val="-2102176456"/>
-        <c:axId val="-2142190120"/>
+        <c:axId val="-2068976120"/>
+        <c:axId val="-2044974600"/>
       </c:bubbleChart>
       <c:valAx>
-        <c:axId val="-2102176456"/>
+        <c:axId val="-2068976120"/>
         <c:scaling>
           <c:orientation val="minMax"/>
         </c:scaling>
@@ -1249,12 +1250,12 @@
         <c:majorTickMark val="out"/>
         <c:minorTickMark val="none"/>
         <c:tickLblPos val="nextTo"/>
-        <c:crossAx val="-2142190120"/>
+        <c:crossAx val="-2044974600"/>
         <c:crossesAt val="-1.5"/>
         <c:crossBetween val="midCat"/>
       </c:valAx>
       <c:valAx>
-        <c:axId val="-2142190120"/>
+        <c:axId val="-2044974600"/>
         <c:scaling>
           <c:orientation val="minMax"/>
         </c:scaling>
@@ -1265,7 +1266,7 @@
         <c:majorTickMark val="out"/>
         <c:minorTickMark val="none"/>
         <c:tickLblPos val="nextTo"/>
-        <c:crossAx val="-2102176456"/>
+        <c:crossAx val="-2068976120"/>
         <c:crosses val="autoZero"/>
         <c:crossBetween val="midCat"/>
       </c:valAx>
@@ -1408,11 +1409,11 @@
         </c:dLbls>
         <c:marker val="1"/>
         <c:smooth val="0"/>
-        <c:axId val="-2079177912"/>
-        <c:axId val="-2079174840"/>
+        <c:axId val="-2069408616"/>
+        <c:axId val="-2045041656"/>
       </c:lineChart>
       <c:dateAx>
-        <c:axId val="-2079177912"/>
+        <c:axId val="-2069408616"/>
         <c:scaling>
           <c:orientation val="minMax"/>
         </c:scaling>
@@ -1422,14 +1423,14 @@
         <c:majorTickMark val="out"/>
         <c:minorTickMark val="none"/>
         <c:tickLblPos val="nextTo"/>
-        <c:crossAx val="-2079174840"/>
+        <c:crossAx val="-2045041656"/>
         <c:crosses val="autoZero"/>
         <c:auto val="1"/>
         <c:lblOffset val="100"/>
         <c:baseTimeUnit val="days"/>
       </c:dateAx>
       <c:valAx>
-        <c:axId val="-2079174840"/>
+        <c:axId val="-2045041656"/>
         <c:scaling>
           <c:orientation val="minMax"/>
         </c:scaling>
@@ -1440,7 +1441,290 @@
         <c:majorTickMark val="out"/>
         <c:minorTickMark val="none"/>
         <c:tickLblPos val="nextTo"/>
-        <c:crossAx val="-2079177912"/>
+        <c:crossAx val="-2069408616"/>
+        <c:crosses val="autoZero"/>
+        <c:crossBetween val="between"/>
+      </c:valAx>
+    </c:plotArea>
+    <c:legend>
+      <c:legendPos val="r"/>
+      <c:layout/>
+      <c:overlay val="0"/>
+    </c:legend>
+    <c:plotVisOnly val="1"/>
+    <c:dispBlanksAs val="gap"/>
+    <c:showDLblsOverMax val="0"/>
+  </c:chart>
+  <c:txPr>
+    <a:bodyPr/>
+    <a:lstStyle/>
+    <a:p>
+      <a:pPr>
+        <a:defRPr sz="1800"/>
+      </a:pPr>
+      <a:endParaRPr lang="en-US"/>
+    </a:p>
+  </c:txPr>
+  <c:externalData r:id="rId1">
+    <c:autoUpdate val="0"/>
+  </c:externalData>
+</c:chartSpace>
+</file>
+
+<file path=ppt/charts/chart8.xml><?xml version="1.0" encoding="utf-8"?>
+<c:chartSpace xmlns:c="http://schemas.openxmlformats.org/drawingml/2006/chart" xmlns:a="http://schemas.openxmlformats.org/drawingml/2006/main" xmlns:r="http://schemas.openxmlformats.org/officeDocument/2006/relationships">
+  <c:date1904 val="0"/>
+  <c:lang val="en-US"/>
+  <c:roundedCorners val="0"/>
+  <mc:AlternateContent xmlns:mc="http://schemas.openxmlformats.org/markup-compatibility/2006">
+    <mc:Choice xmlns:c14="http://schemas.microsoft.com/office/drawing/2007/8/2/chart" Requires="c14">
+      <c14:style val="118"/>
+    </mc:Choice>
+    <mc:Fallback>
+      <c:style val="18"/>
+    </mc:Fallback>
+  </mc:AlternateContent>
+  <c:chart>
+    <c:autoTitleDeleted val="0"/>
+    <c:plotArea>
+      <c:layout/>
+      <c:barChart>
+        <c:barDir val="col"/>
+        <c:grouping val="clustered"/>
+        <c:varyColors val="0"/>
+        <c:ser>
+          <c:idx val="0"/>
+          <c:order val="0"/>
+          <c:tx>
+            <c:strRef>
+              <c:f>Sheet1!$B$1</c:f>
+              <c:strCache>
+                <c:ptCount val="1"/>
+                <c:pt idx="0">
+                  <c:v>Series 1</c:v>
+                </c:pt>
+              </c:strCache>
+            </c:strRef>
+          </c:tx>
+          <c:invertIfNegative val="0"/>
+          <c:cat>
+            <c:strRef>
+              <c:f>Sheet1!$A$2:$A$5</c:f>
+              <c:strCache>
+                <c:ptCount val="4"/>
+                <c:pt idx="0">
+                  <c:v>Category 1</c:v>
+                </c:pt>
+                <c:pt idx="1">
+                  <c:v>Category 2</c:v>
+                </c:pt>
+                <c:pt idx="2">
+                  <c:v>Category 3</c:v>
+                </c:pt>
+                <c:pt idx="3">
+                  <c:v>Category 4</c:v>
+                </c:pt>
+              </c:strCache>
+            </c:strRef>
+          </c:cat>
+          <c:val>
+            <c:numRef>
+              <c:f>Sheet1!$B$2:$B$5</c:f>
+              <c:numCache>
+                <c:formatCode>General</c:formatCode>
+                <c:ptCount val="4"/>
+                <c:pt idx="0">
+                  <c:v>4.3</c:v>
+                </c:pt>
+                <c:pt idx="1">
+                  <c:v>2.5</c:v>
+                </c:pt>
+                <c:pt idx="2">
+                  <c:v>3.5</c:v>
+                </c:pt>
+                <c:pt idx="3">
+                  <c:v>4.5</c:v>
+                </c:pt>
+              </c:numCache>
+            </c:numRef>
+          </c:val>
+        </c:ser>
+        <c:ser>
+          <c:idx val="1"/>
+          <c:order val="1"/>
+          <c:tx>
+            <c:strRef>
+              <c:f>Sheet1!$C$1</c:f>
+              <c:strCache>
+                <c:ptCount val="1"/>
+                <c:pt idx="0">
+                  <c:v>Series 2</c:v>
+                </c:pt>
+              </c:strCache>
+            </c:strRef>
+          </c:tx>
+          <c:invertIfNegative val="0"/>
+          <c:cat>
+            <c:strRef>
+              <c:f>Sheet1!$A$2:$A$5</c:f>
+              <c:strCache>
+                <c:ptCount val="4"/>
+                <c:pt idx="0">
+                  <c:v>Category 1</c:v>
+                </c:pt>
+                <c:pt idx="1">
+                  <c:v>Category 2</c:v>
+                </c:pt>
+                <c:pt idx="2">
+                  <c:v>Category 3</c:v>
+                </c:pt>
+                <c:pt idx="3">
+                  <c:v>Category 4</c:v>
+                </c:pt>
+              </c:strCache>
+            </c:strRef>
+          </c:cat>
+          <c:val>
+            <c:numRef>
+              <c:f>Sheet1!$C$2:$C$5</c:f>
+              <c:numCache>
+                <c:formatCode>General</c:formatCode>
+                <c:ptCount val="4"/>
+                <c:pt idx="0">
+                  <c:v>2.4</c:v>
+                </c:pt>
+                <c:pt idx="1">
+                  <c:v>4.4</c:v>
+                </c:pt>
+                <c:pt idx="2">
+                  <c:v>1.8</c:v>
+                </c:pt>
+                <c:pt idx="3">
+                  <c:v>2.8</c:v>
+                </c:pt>
+              </c:numCache>
+            </c:numRef>
+          </c:val>
+        </c:ser>
+        <c:ser>
+          <c:idx val="2"/>
+          <c:order val="2"/>
+          <c:tx>
+            <c:strRef>
+              <c:f>Sheet1!$D$1</c:f>
+              <c:strCache>
+                <c:ptCount val="1"/>
+                <c:pt idx="0">
+                  <c:v>Series 3</c:v>
+                </c:pt>
+              </c:strCache>
+            </c:strRef>
+          </c:tx>
+          <c:invertIfNegative val="0"/>
+          <c:cat>
+            <c:strRef>
+              <c:f>Sheet1!$A$2:$A$5</c:f>
+              <c:strCache>
+                <c:ptCount val="4"/>
+                <c:pt idx="0">
+                  <c:v>Category 1</c:v>
+                </c:pt>
+                <c:pt idx="1">
+                  <c:v>Category 2</c:v>
+                </c:pt>
+                <c:pt idx="2">
+                  <c:v>Category 3</c:v>
+                </c:pt>
+                <c:pt idx="3">
+                  <c:v>Category 4</c:v>
+                </c:pt>
+              </c:strCache>
+            </c:strRef>
+          </c:cat>
+          <c:val>
+            <c:numRef>
+              <c:f>Sheet1!$D$2:$D$5</c:f>
+              <c:numCache>
+                <c:formatCode>General</c:formatCode>
+                <c:ptCount val="4"/>
+                <c:pt idx="0">
+                  <c:v>2.0</c:v>
+                </c:pt>
+                <c:pt idx="1">
+                  <c:v>2.0</c:v>
+                </c:pt>
+                <c:pt idx="2">
+                  <c:v>3.0</c:v>
+                </c:pt>
+                <c:pt idx="3">
+                  <c:v>5.0</c:v>
+                </c:pt>
+              </c:numCache>
+            </c:numRef>
+          </c:val>
+        </c:ser>
+        <c:dLbls>
+          <c:showLegendKey val="0"/>
+          <c:showVal val="0"/>
+          <c:showCatName val="0"/>
+          <c:showSerName val="0"/>
+          <c:showPercent val="0"/>
+          <c:showBubbleSize val="0"/>
+        </c:dLbls>
+        <c:gapWidth val="150"/>
+        <c:axId val="-1986060888"/>
+        <c:axId val="-1984405480"/>
+      </c:barChart>
+      <c:catAx>
+        <c:axId val="-1986060888"/>
+        <c:scaling>
+          <c:orientation val="minMax"/>
+        </c:scaling>
+        <c:delete val="0"/>
+        <c:axPos val="b"/>
+        <c:majorTickMark val="out"/>
+        <c:minorTickMark val="none"/>
+        <c:tickLblPos val="nextTo"/>
+        <c:crossAx val="-1984405480"/>
+        <c:crosses val="autoZero"/>
+        <c:auto val="1"/>
+        <c:lblAlgn val="ctr"/>
+        <c:lblOffset val="100"/>
+        <c:noMultiLvlLbl val="0"/>
+      </c:catAx>
+      <c:valAx>
+        <c:axId val="-1984405480"/>
+        <c:scaling>
+          <c:orientation val="minMax"/>
+        </c:scaling>
+        <c:delete val="0"/>
+        <c:axPos val="l"/>
+        <c:majorGridlines/>
+        <c:title>
+          <c:tx>
+            <c:rich>
+              <a:bodyPr rot="-5400000" vert="horz"/>
+              <a:lstStyle/>
+              <a:p>
+                <a:pPr>
+                  <a:defRPr/>
+                </a:pPr>
+                <a:r>
+                  <a:rPr lang="en-US" dirty="0" smtClean="0"/>
+                  <a:t>Foobar</a:t>
+                </a:r>
+                <a:endParaRPr lang="en-US" dirty="0"/>
+              </a:p>
+            </c:rich>
+          </c:tx>
+          <c:layout/>
+          <c:overlay val="0"/>
+        </c:title>
+        <c:numFmt formatCode="General" sourceLinked="1"/>
+        <c:majorTickMark val="out"/>
+        <c:minorTickMark val="none"/>
+        <c:tickLblPos val="nextTo"/>
+        <c:crossAx val="-1986060888"/>
         <c:crosses val="autoZero"/>
         <c:crossBetween val="between"/>
       </c:valAx>
@@ -2140,6 +2424,58 @@
 </p:sld>
 </file>
 
+<file path=ppt/slides/slide8.xml><?xml version="1.0" encoding="utf-8"?>
+<p:sld xmlns:a="http://schemas.openxmlformats.org/drawingml/2006/main" xmlns:r="http://schemas.openxmlformats.org/officeDocument/2006/relationships" xmlns:p="http://schemas.openxmlformats.org/presentationml/2006/main">
+  <p:cSld>
+    <p:spTree>
+      <p:nvGrpSpPr>
+        <p:cNvPr id="1" name=""/>
+        <p:cNvGrpSpPr/>
+        <p:nvPr/>
+      </p:nvGrpSpPr>
+      <p:grpSpPr>
+        <a:xfrm>
+          <a:off x="0" y="0"/>
+          <a:ext cx="0" cy="0"/>
+          <a:chOff x="0" y="0"/>
+          <a:chExt cx="0" cy="0"/>
+        </a:xfrm>
+      </p:grpSpPr>
+      <p:graphicFrame>
+        <p:nvGraphicFramePr>
+          <p:cNvPr id="2" name="Chart 1"/>
+          <p:cNvGraphicFramePr/>
+          <p:nvPr>
+            <p:extLst>
+              <p:ext uri="{D42A27DB-BD31-4B8C-83A1-F6EECF244321}">
+                <p14:modId xmlns:p14="http://schemas.microsoft.com/office/powerpoint/2010/main" val="982070905"/>
+              </p:ext>
+            </p:extLst>
+          </p:nvPr>
+        </p:nvGraphicFramePr>
+        <p:xfrm>
+          <a:off x="1524000" y="1397000"/>
+          <a:ext cx="6096000" cy="4064000"/>
+        </p:xfrm>
+        <a:graphic>
+          <a:graphicData uri="http://schemas.openxmlformats.org/drawingml/2006/chart">
+            <c:chart xmlns:c="http://schemas.openxmlformats.org/drawingml/2006/chart" xmlns:r="http://schemas.openxmlformats.org/officeDocument/2006/relationships" r:id="rId2"/>
+          </a:graphicData>
+        </a:graphic>
+      </p:graphicFrame>
+    </p:spTree>
+    <p:extLst>
+      <p:ext uri="{BB962C8B-B14F-4D97-AF65-F5344CB8AC3E}">
+        <p14:creationId xmlns:p14="http://schemas.microsoft.com/office/powerpoint/2010/main" val="3506779368"/>
+      </p:ext>
+    </p:extLst>
+  </p:cSld>
+  <p:clrMapOvr>
+    <a:masterClrMapping/>
+  </p:clrMapOvr>
+</p:sld>
+</file>
+
 <file path=ppt/theme/theme1.xml><?xml version="1.0" encoding="utf-8"?>
 <a:theme xmlns:a="http://schemas.openxmlformats.org/drawingml/2006/main" name="Office Theme">
   <a:themeElements>

</xml_diff>

<commit_message>
xfail: add Axis.reverse_order acceptance tests
</commit_message>
<xml_diff>
--- a/features/steps/test_files/cht-axis-props.pptx
+++ b/features/steps/test_files/cht-axis-props.pptx
@@ -111,11 +111,27 @@
       </a:defRPr>
     </a:lvl9pPr>
   </p:defaultTextStyle>
+  <p:extLst>
+    <p:ext uri="{EFAFB233-063F-42B5-8137-9DF3F51BA10A}">
+      <p15:sldGuideLst xmlns:p15="http://schemas.microsoft.com/office/powerpoint/2012/main">
+        <p15:guide id="1" orient="horz" pos="2160">
+          <p15:clr>
+            <a:srgbClr val="A4A3A4"/>
+          </p15:clr>
+        </p15:guide>
+        <p15:guide id="2" pos="2880">
+          <p15:clr>
+            <a:srgbClr val="A4A3A4"/>
+          </p15:clr>
+        </p15:guide>
+      </p15:sldGuideLst>
+    </p:ext>
+  </p:extLst>
 </p:presentation>
 </file>
 
 <file path=ppt/charts/chart1.xml><?xml version="1.0" encoding="utf-8"?>
-<c:chartSpace xmlns:c="http://schemas.openxmlformats.org/drawingml/2006/chart" xmlns:a="http://schemas.openxmlformats.org/drawingml/2006/main" xmlns:r="http://schemas.openxmlformats.org/officeDocument/2006/relationships">
+<c:chartSpace xmlns:c="http://schemas.openxmlformats.org/drawingml/2006/chart" xmlns:a="http://schemas.openxmlformats.org/drawingml/2006/main" xmlns:r="http://schemas.openxmlformats.org/officeDocument/2006/relationships" xmlns:c16r2="http://schemas.microsoft.com/office/drawing/2015/06/chart">
   <c:date1904 val="0"/>
   <c:lang val="en-US"/>
   <c:roundedCorners val="0"/>
@@ -191,6 +207,11 @@
               </c:numCache>
             </c:numRef>
           </c:val>
+          <c:extLst>
+            <c:ext xmlns:c16="http://schemas.microsoft.com/office/drawing/2014/chart" uri="{C3380CC4-5D6E-409C-BE32-E72D297353CC}">
+              <c16:uniqueId val="{00000000-2742-F44A-B82E-D6CA97927A32}"/>
+            </c:ext>
+          </c:extLst>
         </c:ser>
         <c:ser>
           <c:idx val="1"/>
@@ -237,7 +258,7 @@
                   <c:v>2.4</c:v>
                 </c:pt>
                 <c:pt idx="1">
-                  <c:v>-4.4</c:v>
+                  <c:v>-4.4000000000000004</c:v>
                 </c:pt>
                 <c:pt idx="2">
                   <c:v>1.8</c:v>
@@ -248,6 +269,11 @@
               </c:numCache>
             </c:numRef>
           </c:val>
+          <c:extLst>
+            <c:ext xmlns:c16="http://schemas.microsoft.com/office/drawing/2014/chart" uri="{C3380CC4-5D6E-409C-BE32-E72D297353CC}">
+              <c16:uniqueId val="{00000001-2742-F44A-B82E-D6CA97927A32}"/>
+            </c:ext>
+          </c:extLst>
         </c:ser>
         <c:ser>
           <c:idx val="2"/>
@@ -291,20 +317,25 @@
                 <c:formatCode>General</c:formatCode>
                 <c:ptCount val="4"/>
                 <c:pt idx="0">
-                  <c:v>2.0</c:v>
-                </c:pt>
-                <c:pt idx="1">
-                  <c:v>2.0</c:v>
-                </c:pt>
-                <c:pt idx="2">
-                  <c:v>-3.0</c:v>
+                  <c:v>2</c:v>
+                </c:pt>
+                <c:pt idx="1">
+                  <c:v>2</c:v>
+                </c:pt>
+                <c:pt idx="2">
+                  <c:v>-3</c:v>
                 </c:pt>
                 <c:pt idx="3">
-                  <c:v>5.0</c:v>
+                  <c:v>5</c:v>
                 </c:pt>
               </c:numCache>
             </c:numRef>
           </c:val>
+          <c:extLst>
+            <c:ext xmlns:c16="http://schemas.microsoft.com/office/drawing/2014/chart" uri="{C3380CC4-5D6E-409C-BE32-E72D297353CC}">
+              <c16:uniqueId val="{00000002-2742-F44A-B82E-D6CA97927A32}"/>
+            </c:ext>
+          </c:extLst>
         </c:ser>
         <c:dLbls>
           <c:showLegendKey val="0"/>
@@ -324,7 +355,8 @@
           <c:orientation val="minMax"/>
         </c:scaling>
         <c:delete val="0"/>
-        <c:axPos val="b"/>
+        <c:axPos val="t"/>
+        <c:numFmt formatCode="General" sourceLinked="0"/>
         <c:majorTickMark val="out"/>
         <c:minorTickMark val="none"/>
         <c:tickLblPos val="nextTo"/>
@@ -338,7 +370,7 @@
       <c:valAx>
         <c:axId val="2104099768"/>
         <c:scaling>
-          <c:orientation val="minMax"/>
+          <c:orientation val="maxMin"/>
         </c:scaling>
         <c:delete val="0"/>
         <c:axPos val="l"/>
@@ -355,7 +387,6 @@
     </c:plotArea>
     <c:legend>
       <c:legendPos val="r"/>
-      <c:layout/>
       <c:overlay val="0"/>
     </c:legend>
     <c:plotVisOnly val="1"/>
@@ -379,7 +410,7 @@
 </file>
 
 <file path=ppt/charts/chart2.xml><?xml version="1.0" encoding="utf-8"?>
-<c:chartSpace xmlns:c="http://schemas.openxmlformats.org/drawingml/2006/chart" xmlns:a="http://schemas.openxmlformats.org/drawingml/2006/main" xmlns:r="http://schemas.openxmlformats.org/officeDocument/2006/relationships">
+<c:chartSpace xmlns:c="http://schemas.openxmlformats.org/drawingml/2006/chart" xmlns:a="http://schemas.openxmlformats.org/drawingml/2006/main" xmlns:r="http://schemas.openxmlformats.org/officeDocument/2006/relationships" xmlns:c16r2="http://schemas.microsoft.com/office/drawing/2015/06/chart">
   <c:date1904 val="0"/>
   <c:lang val="en-US"/>
   <c:roundedCorners val="0"/>
@@ -455,6 +486,11 @@
               </c:numCache>
             </c:numRef>
           </c:val>
+          <c:extLst>
+            <c:ext xmlns:c16="http://schemas.microsoft.com/office/drawing/2014/chart" uri="{C3380CC4-5D6E-409C-BE32-E72D297353CC}">
+              <c16:uniqueId val="{00000000-DC1A-3549-AFBA-D31CDBCCD810}"/>
+            </c:ext>
+          </c:extLst>
         </c:ser>
         <c:ser>
           <c:idx val="1"/>
@@ -501,7 +537,7 @@
                   <c:v>2.4</c:v>
                 </c:pt>
                 <c:pt idx="1">
-                  <c:v>4.4</c:v>
+                  <c:v>4.4000000000000004</c:v>
                 </c:pt>
                 <c:pt idx="2">
                   <c:v>1.8</c:v>
@@ -512,6 +548,11 @@
               </c:numCache>
             </c:numRef>
           </c:val>
+          <c:extLst>
+            <c:ext xmlns:c16="http://schemas.microsoft.com/office/drawing/2014/chart" uri="{C3380CC4-5D6E-409C-BE32-E72D297353CC}">
+              <c16:uniqueId val="{00000001-DC1A-3549-AFBA-D31CDBCCD810}"/>
+            </c:ext>
+          </c:extLst>
         </c:ser>
         <c:ser>
           <c:idx val="2"/>
@@ -555,20 +596,25 @@
                 <c:formatCode>General</c:formatCode>
                 <c:ptCount val="4"/>
                 <c:pt idx="0">
-                  <c:v>2.0</c:v>
-                </c:pt>
-                <c:pt idx="1">
-                  <c:v>2.0</c:v>
-                </c:pt>
-                <c:pt idx="2">
-                  <c:v>3.0</c:v>
+                  <c:v>2</c:v>
+                </c:pt>
+                <c:pt idx="1">
+                  <c:v>2</c:v>
+                </c:pt>
+                <c:pt idx="2">
+                  <c:v>3</c:v>
                 </c:pt>
                 <c:pt idx="3">
-                  <c:v>5.0</c:v>
+                  <c:v>5</c:v>
                 </c:pt>
               </c:numCache>
             </c:numRef>
           </c:val>
+          <c:extLst>
+            <c:ext xmlns:c16="http://schemas.microsoft.com/office/drawing/2014/chart" uri="{C3380CC4-5D6E-409C-BE32-E72D297353CC}">
+              <c16:uniqueId val="{00000002-DC1A-3549-AFBA-D31CDBCCD810}"/>
+            </c:ext>
+          </c:extLst>
         </c:ser>
         <c:dLbls>
           <c:showLegendKey val="0"/>
@@ -589,6 +635,7 @@
         </c:scaling>
         <c:delete val="0"/>
         <c:axPos val="b"/>
+        <c:numFmt formatCode="General" sourceLinked="0"/>
         <c:majorTickMark val="out"/>
         <c:minorTickMark val="none"/>
         <c:tickLblPos val="nextTo"/>
@@ -614,13 +661,12 @@
         <c:crossAx val="-2046209464"/>
         <c:crosses val="autoZero"/>
         <c:crossBetween val="between"/>
-        <c:majorUnit val="20.0"/>
+        <c:majorUnit val="20"/>
         <c:minorUnit val="4.2"/>
       </c:valAx>
     </c:plotArea>
     <c:legend>
       <c:legendPos val="r"/>
-      <c:layout/>
       <c:overlay val="0"/>
     </c:legend>
     <c:plotVisOnly val="1"/>
@@ -644,7 +690,7 @@
 </file>
 
 <file path=ppt/charts/chart3.xml><?xml version="1.0" encoding="utf-8"?>
-<c:chartSpace xmlns:c="http://schemas.openxmlformats.org/drawingml/2006/chart" xmlns:a="http://schemas.openxmlformats.org/drawingml/2006/main" xmlns:r="http://schemas.openxmlformats.org/officeDocument/2006/relationships">
+<c:chartSpace xmlns:c="http://schemas.openxmlformats.org/drawingml/2006/chart" xmlns:a="http://schemas.openxmlformats.org/drawingml/2006/main" xmlns:r="http://schemas.openxmlformats.org/officeDocument/2006/relationships" xmlns:c16r2="http://schemas.microsoft.com/office/drawing/2015/06/chart">
   <c:date1904 val="0"/>
   <c:lang val="en-US"/>
   <c:roundedCorners val="0"/>
@@ -667,13 +713,13 @@
               <a:defRPr sz="2000"/>
             </a:pPr>
             <a:r>
-              <a:rPr lang="en-US" sz="1600" b="0" i="1" baseline="0" dirty="0" err="1" smtClean="0">
+              <a:rPr lang="en-US" sz="1600" b="0" i="1" baseline="0" dirty="0" err="1">
                 <a:effectLst/>
               </a:rPr>
               <a:t>value_axis.crosses</a:t>
             </a:r>
             <a:r>
-              <a:rPr lang="en-US" sz="1600" b="0" i="1" baseline="0" dirty="0" smtClean="0">
+              <a:rPr lang="en-US" sz="1600" b="0" i="1" baseline="0" dirty="0">
                 <a:effectLst/>
               </a:rPr>
               <a:t> == XL_AXIS_CROSSES.MAXIMUM</a:t>
@@ -684,7 +730,6 @@
           </a:p>
         </c:rich>
       </c:tx>
-      <c:layout/>
       <c:overlay val="0"/>
     </c:title>
     <c:autoTitleDeleted val="0"/>
@@ -749,6 +794,11 @@
             </c:numRef>
           </c:yVal>
           <c:smooth val="0"/>
+          <c:extLst>
+            <c:ext xmlns:c16="http://schemas.microsoft.com/office/drawing/2014/chart" uri="{C3380CC4-5D6E-409C-BE32-E72D297353CC}">
+              <c16:uniqueId val="{00000000-5F53-974F-838B-F669DF90ECAC}"/>
+            </c:ext>
+          </c:extLst>
         </c:ser>
         <c:dLbls>
           <c:showLegendKey val="0"/>
@@ -814,7 +864,7 @@
 </file>
 
 <file path=ppt/charts/chart4.xml><?xml version="1.0" encoding="utf-8"?>
-<c:chartSpace xmlns:c="http://schemas.openxmlformats.org/drawingml/2006/chart" xmlns:a="http://schemas.openxmlformats.org/drawingml/2006/main" xmlns:r="http://schemas.openxmlformats.org/officeDocument/2006/relationships">
+<c:chartSpace xmlns:c="http://schemas.openxmlformats.org/drawingml/2006/chart" xmlns:a="http://schemas.openxmlformats.org/drawingml/2006/main" xmlns:r="http://schemas.openxmlformats.org/officeDocument/2006/relationships" xmlns:c16r2="http://schemas.microsoft.com/office/drawing/2015/06/chart">
   <c:date1904 val="0"/>
   <c:lang val="en-US"/>
   <c:roundedCorners val="0"/>
@@ -837,18 +887,16 @@
               <a:defRPr sz="1600" b="0" i="1"/>
             </a:pPr>
             <a:r>
-              <a:rPr lang="en-US" sz="1600" b="0" i="1" dirty="0" err="1" smtClean="0"/>
+              <a:rPr lang="en-US" sz="1600" b="0" i="1" dirty="0" err="1"/>
               <a:t>value_axis.crosses</a:t>
             </a:r>
             <a:r>
-              <a:rPr lang="en-US" sz="1600" b="0" i="1" dirty="0" smtClean="0"/>
+              <a:rPr lang="en-US" sz="1600" b="0" i="1" dirty="0"/>
               <a:t> == XL_AXIS_CROSSES.MINIMUM</a:t>
             </a:r>
-            <a:endParaRPr lang="en-US" sz="1600" b="0" i="1" dirty="0"/>
           </a:p>
         </c:rich>
       </c:tx>
-      <c:layout/>
       <c:overlay val="0"/>
     </c:title>
     <c:autoTitleDeleted val="0"/>
@@ -914,18 +962,23 @@
                 <c:formatCode>General</c:formatCode>
                 <c:ptCount val="3"/>
                 <c:pt idx="0">
-                  <c:v>10.0</c:v>
-                </c:pt>
-                <c:pt idx="1">
-                  <c:v>4.0</c:v>
-                </c:pt>
-                <c:pt idx="2">
-                  <c:v>8.0</c:v>
+                  <c:v>10</c:v>
+                </c:pt>
+                <c:pt idx="1">
+                  <c:v>4</c:v>
+                </c:pt>
+                <c:pt idx="2">
+                  <c:v>8</c:v>
                 </c:pt>
               </c:numCache>
             </c:numRef>
           </c:bubbleSize>
           <c:bubble3D val="0"/>
+          <c:extLst>
+            <c:ext xmlns:c16="http://schemas.microsoft.com/office/drawing/2014/chart" uri="{C3380CC4-5D6E-409C-BE32-E72D297353CC}">
+              <c16:uniqueId val="{00000000-00B8-A84C-97A4-C0FAD678ABDB}"/>
+            </c:ext>
+          </c:extLst>
         </c:ser>
         <c:dLbls>
           <c:showLegendKey val="0"/>
@@ -993,7 +1046,7 @@
 </file>
 
 <file path=ppt/charts/chart5.xml><?xml version="1.0" encoding="utf-8"?>
-<c:chartSpace xmlns:c="http://schemas.openxmlformats.org/drawingml/2006/chart" xmlns:a="http://schemas.openxmlformats.org/drawingml/2006/main" xmlns:r="http://schemas.openxmlformats.org/officeDocument/2006/relationships">
+<c:chartSpace xmlns:c="http://schemas.openxmlformats.org/drawingml/2006/chart" xmlns:a="http://schemas.openxmlformats.org/drawingml/2006/main" xmlns:r="http://schemas.openxmlformats.org/officeDocument/2006/relationships" xmlns:c16r2="http://schemas.microsoft.com/office/drawing/2015/06/chart">
   <c:date1904 val="0"/>
   <c:lang val="en-US"/>
   <c:roundedCorners val="0"/>
@@ -1068,6 +1121,11 @@
             </c:numRef>
           </c:yVal>
           <c:smooth val="0"/>
+          <c:extLst>
+            <c:ext xmlns:c16="http://schemas.microsoft.com/office/drawing/2014/chart" uri="{C3380CC4-5D6E-409C-BE32-E72D297353CC}">
+              <c16:uniqueId val="{00000000-550A-D048-98F1-E68CEE6E6322}"/>
+            </c:ext>
+          </c:extLst>
         </c:ser>
         <c:dLbls>
           <c:showLegendKey val="0"/>
@@ -1133,7 +1191,7 @@
 </file>
 
 <file path=ppt/charts/chart6.xml><?xml version="1.0" encoding="utf-8"?>
-<c:chartSpace xmlns:c="http://schemas.openxmlformats.org/drawingml/2006/chart" xmlns:a="http://schemas.openxmlformats.org/drawingml/2006/main" xmlns:r="http://schemas.openxmlformats.org/officeDocument/2006/relationships">
+<c:chartSpace xmlns:c="http://schemas.openxmlformats.org/drawingml/2006/chart" xmlns:a="http://schemas.openxmlformats.org/drawingml/2006/main" xmlns:r="http://schemas.openxmlformats.org/officeDocument/2006/relationships" xmlns:c16r2="http://schemas.microsoft.com/office/drawing/2015/06/chart">
   <c:date1904 val="0"/>
   <c:lang val="en-US"/>
   <c:roundedCorners val="0"/>
@@ -1147,7 +1205,6 @@
   </mc:AlternateContent>
   <c:chart>
     <c:title>
-      <c:layout/>
       <c:overlay val="0"/>
     </c:title>
     <c:autoTitleDeleted val="0"/>
@@ -1213,18 +1270,23 @@
                 <c:formatCode>General</c:formatCode>
                 <c:ptCount val="3"/>
                 <c:pt idx="0">
-                  <c:v>10.0</c:v>
-                </c:pt>
-                <c:pt idx="1">
-                  <c:v>4.0</c:v>
-                </c:pt>
-                <c:pt idx="2">
-                  <c:v>8.0</c:v>
+                  <c:v>10</c:v>
+                </c:pt>
+                <c:pt idx="1">
+                  <c:v>4</c:v>
+                </c:pt>
+                <c:pt idx="2">
+                  <c:v>8</c:v>
                 </c:pt>
               </c:numCache>
             </c:numRef>
           </c:bubbleSize>
           <c:bubble3D val="1"/>
+          <c:extLst>
+            <c:ext xmlns:c16="http://schemas.microsoft.com/office/drawing/2014/chart" uri="{C3380CC4-5D6E-409C-BE32-E72D297353CC}">
+              <c16:uniqueId val="{00000000-7E84-B246-BD73-6E95452CD69F}"/>
+            </c:ext>
+          </c:extLst>
         </c:ser>
         <c:dLbls>
           <c:showLegendKey val="0"/>
@@ -1273,7 +1335,6 @@
     </c:plotArea>
     <c:legend>
       <c:legendPos val="r"/>
-      <c:layout/>
       <c:overlay val="0"/>
     </c:legend>
     <c:plotVisOnly val="1"/>
@@ -1297,7 +1358,7 @@
 </file>
 
 <file path=ppt/charts/chart7.xml><?xml version="1.0" encoding="utf-8"?>
-<c:chartSpace xmlns:c="http://schemas.openxmlformats.org/drawingml/2006/chart" xmlns:a="http://schemas.openxmlformats.org/drawingml/2006/main" xmlns:r="http://schemas.openxmlformats.org/officeDocument/2006/relationships">
+<c:chartSpace xmlns:c="http://schemas.openxmlformats.org/drawingml/2006/chart" xmlns:a="http://schemas.openxmlformats.org/drawingml/2006/main" xmlns:r="http://schemas.openxmlformats.org/officeDocument/2006/relationships" xmlns:c16r2="http://schemas.microsoft.com/office/drawing/2015/06/chart">
   <c:date1904 val="0"/>
   <c:lang val="en-US"/>
   <c:roundedCorners val="0"/>
@@ -1311,7 +1372,6 @@
   </mc:AlternateContent>
   <c:chart>
     <c:title>
-      <c:layout/>
       <c:overlay val="0"/>
     </c:title>
     <c:autoTitleDeleted val="0"/>
@@ -1344,25 +1404,25 @@
                 <c:formatCode>m/d/yy</c:formatCode>
                 <c:ptCount val="7"/>
                 <c:pt idx="0">
-                  <c:v>25204.0</c:v>
-                </c:pt>
-                <c:pt idx="1">
-                  <c:v>25205.0</c:v>
-                </c:pt>
-                <c:pt idx="2">
-                  <c:v>25215.0</c:v>
+                  <c:v>25204</c:v>
+                </c:pt>
+                <c:pt idx="1">
+                  <c:v>25205</c:v>
+                </c:pt>
+                <c:pt idx="2">
+                  <c:v>25215</c:v>
                 </c:pt>
                 <c:pt idx="3">
-                  <c:v>25223.0</c:v>
+                  <c:v>25223</c:v>
                 </c:pt>
                 <c:pt idx="4">
-                  <c:v>25233.0</c:v>
+                  <c:v>25233</c:v>
                 </c:pt>
                 <c:pt idx="5">
-                  <c:v>25244.0</c:v>
+                  <c:v>25244</c:v>
                 </c:pt>
                 <c:pt idx="6">
-                  <c:v>25254.0</c:v>
+                  <c:v>25254</c:v>
                 </c:pt>
               </c:numCache>
             </c:numRef>
@@ -1389,15 +1449,20 @@
                   <c:v>3.6</c:v>
                 </c:pt>
                 <c:pt idx="5">
-                  <c:v>15.0</c:v>
+                  <c:v>15</c:v>
                 </c:pt>
                 <c:pt idx="6">
-                  <c:v>17.0</c:v>
+                  <c:v>17</c:v>
                 </c:pt>
               </c:numCache>
             </c:numRef>
           </c:val>
           <c:smooth val="0"/>
+          <c:extLst>
+            <c:ext xmlns:c16="http://schemas.microsoft.com/office/drawing/2014/chart" uri="{C3380CC4-5D6E-409C-BE32-E72D297353CC}">
+              <c16:uniqueId val="{00000000-564A-FA49-B9F8-8AC8FB34C5A8}"/>
+            </c:ext>
+          </c:extLst>
         </c:ser>
         <c:dLbls>
           <c:showLegendKey val="0"/>
@@ -1407,7 +1472,6 @@
           <c:showPercent val="0"/>
           <c:showBubbleSize val="0"/>
         </c:dLbls>
-        <c:marker val="1"/>
         <c:smooth val="0"/>
         <c:axId val="-2069408616"/>
         <c:axId val="-2045041656"/>
@@ -1448,7 +1512,6 @@
     </c:plotArea>
     <c:legend>
       <c:legendPos val="r"/>
-      <c:layout/>
       <c:overlay val="0"/>
     </c:legend>
     <c:plotVisOnly val="1"/>
@@ -1472,7 +1535,7 @@
 </file>
 
 <file path=ppt/charts/chart8.xml><?xml version="1.0" encoding="utf-8"?>
-<c:chartSpace xmlns:c="http://schemas.openxmlformats.org/drawingml/2006/chart" xmlns:a="http://schemas.openxmlformats.org/drawingml/2006/main" xmlns:r="http://schemas.openxmlformats.org/officeDocument/2006/relationships">
+<c:chartSpace xmlns:c="http://schemas.openxmlformats.org/drawingml/2006/chart" xmlns:a="http://schemas.openxmlformats.org/drawingml/2006/main" xmlns:r="http://schemas.openxmlformats.org/officeDocument/2006/relationships" xmlns:c16r2="http://schemas.microsoft.com/office/drawing/2015/06/chart">
   <c:date1904 val="0"/>
   <c:lang val="en-US"/>
   <c:roundedCorners val="0"/>
@@ -1548,6 +1611,11 @@
               </c:numCache>
             </c:numRef>
           </c:val>
+          <c:extLst>
+            <c:ext xmlns:c16="http://schemas.microsoft.com/office/drawing/2014/chart" uri="{C3380CC4-5D6E-409C-BE32-E72D297353CC}">
+              <c16:uniqueId val="{00000000-74C4-E645-9508-076F3CFBA44C}"/>
+            </c:ext>
+          </c:extLst>
         </c:ser>
         <c:ser>
           <c:idx val="1"/>
@@ -1594,7 +1662,7 @@
                   <c:v>2.4</c:v>
                 </c:pt>
                 <c:pt idx="1">
-                  <c:v>4.4</c:v>
+                  <c:v>4.4000000000000004</c:v>
                 </c:pt>
                 <c:pt idx="2">
                   <c:v>1.8</c:v>
@@ -1605,6 +1673,11 @@
               </c:numCache>
             </c:numRef>
           </c:val>
+          <c:extLst>
+            <c:ext xmlns:c16="http://schemas.microsoft.com/office/drawing/2014/chart" uri="{C3380CC4-5D6E-409C-BE32-E72D297353CC}">
+              <c16:uniqueId val="{00000001-74C4-E645-9508-076F3CFBA44C}"/>
+            </c:ext>
+          </c:extLst>
         </c:ser>
         <c:ser>
           <c:idx val="2"/>
@@ -1648,20 +1721,25 @@
                 <c:formatCode>General</c:formatCode>
                 <c:ptCount val="4"/>
                 <c:pt idx="0">
-                  <c:v>2.0</c:v>
-                </c:pt>
-                <c:pt idx="1">
-                  <c:v>2.0</c:v>
-                </c:pt>
-                <c:pt idx="2">
-                  <c:v>3.0</c:v>
+                  <c:v>2</c:v>
+                </c:pt>
+                <c:pt idx="1">
+                  <c:v>2</c:v>
+                </c:pt>
+                <c:pt idx="2">
+                  <c:v>3</c:v>
                 </c:pt>
                 <c:pt idx="3">
-                  <c:v>5.0</c:v>
+                  <c:v>5</c:v>
                 </c:pt>
               </c:numCache>
             </c:numRef>
           </c:val>
+          <c:extLst>
+            <c:ext xmlns:c16="http://schemas.microsoft.com/office/drawing/2014/chart" uri="{C3380CC4-5D6E-409C-BE32-E72D297353CC}">
+              <c16:uniqueId val="{00000002-74C4-E645-9508-076F3CFBA44C}"/>
+            </c:ext>
+          </c:extLst>
         </c:ser>
         <c:dLbls>
           <c:showLegendKey val="0"/>
@@ -1682,6 +1760,7 @@
         </c:scaling>
         <c:delete val="0"/>
         <c:axPos val="b"/>
+        <c:numFmt formatCode="General" sourceLinked="0"/>
         <c:majorTickMark val="out"/>
         <c:minorTickMark val="none"/>
         <c:tickLblPos val="nextTo"/>
@@ -1710,14 +1789,12 @@
                   <a:defRPr/>
                 </a:pPr>
                 <a:r>
-                  <a:rPr lang="en-US" dirty="0" smtClean="0"/>
+                  <a:rPr lang="en-US" dirty="0"/>
                   <a:t>Foobar</a:t>
                 </a:r>
-                <a:endParaRPr lang="en-US" dirty="0"/>
               </a:p>
             </c:rich>
           </c:tx>
-          <c:layout/>
           <c:overlay val="0"/>
         </c:title>
         <c:numFmt formatCode="General" sourceLinked="1"/>
@@ -1731,7 +1808,6 @@
     </c:plotArea>
     <c:legend>
       <c:legendPos val="r"/>
-      <c:layout/>
       <c:overlay val="0"/>
     </c:legend>
     <c:plotVisOnly val="1"/>

</xml_diff>